<commit_message>
Small changes to Intro to Malloc and vuln classes slides -- buffer overflow diagram
</commit_message>
<xml_diff>
--- a/modules/vuln_classes/vuln_classes.pptx
+++ b/modules/vuln_classes/vuln_classes.pptx
@@ -5201,7 +5201,7 @@
   <dgm:whole/>
   <dgm:extLst>
     <a:ext uri="http://schemas.microsoft.com/office/drawing/2008/diagram">
-      <dsp:dataModelExt xmlns:dsp="http://schemas.microsoft.com/office/drawing/2008/diagram" relId="rId6" minVer="http://schemas.openxmlformats.org/drawingml/2006/diagram"/>
+      <dsp:dataModelExt xmlns:dsp="http://schemas.microsoft.com/office/drawing/2008/diagram" relId="rId7" minVer="http://schemas.openxmlformats.org/drawingml/2006/diagram"/>
     </a:ext>
   </dgm:extLst>
 </dgm:dataModel>
@@ -16022,7 +16022,7 @@
           <a:p>
             <a:fld id="{2DA23E8D-1792-1541-9147-970A8DD8A355}" type="datetimeFigureOut">
               <a:rPr lang="en-US" smtClean="0"/>
-              <a:t>7/19/21</a:t>
+              <a:t>7/21/21</a:t>
             </a:fld>
             <a:endParaRPr lang="en-US" dirty="0"/>
           </a:p>
@@ -16287,6 +16287,93 @@
     </a:lvl9pPr>
   </p:notesStyle>
 </p:notesMaster>
+</file>
+
+<file path=ppt/notesSlides/notesSlide1.xml><?xml version="1.0" encoding="utf-8"?>
+<p:notes xmlns:a="http://schemas.openxmlformats.org/drawingml/2006/main" xmlns:r="http://schemas.openxmlformats.org/officeDocument/2006/relationships" xmlns:p="http://schemas.openxmlformats.org/presentationml/2006/main">
+  <p:cSld>
+    <p:spTree>
+      <p:nvGrpSpPr>
+        <p:cNvPr id="1" name=""/>
+        <p:cNvGrpSpPr/>
+        <p:nvPr/>
+      </p:nvGrpSpPr>
+      <p:grpSpPr>
+        <a:xfrm>
+          <a:off x="0" y="0"/>
+          <a:ext cx="0" cy="0"/>
+          <a:chOff x="0" y="0"/>
+          <a:chExt cx="0" cy="0"/>
+        </a:xfrm>
+      </p:grpSpPr>
+      <p:sp>
+        <p:nvSpPr>
+          <p:cNvPr id="2" name="Slide Image Placeholder 1"/>
+          <p:cNvSpPr>
+            <a:spLocks noGrp="1" noRot="1" noChangeAspect="1"/>
+          </p:cNvSpPr>
+          <p:nvPr>
+            <p:ph type="sldImg"/>
+          </p:nvPr>
+        </p:nvSpPr>
+        <p:spPr/>
+      </p:sp>
+      <p:sp>
+        <p:nvSpPr>
+          <p:cNvPr id="3" name="Notes Placeholder 2"/>
+          <p:cNvSpPr>
+            <a:spLocks noGrp="1"/>
+          </p:cNvSpPr>
+          <p:nvPr>
+            <p:ph type="body" idx="1"/>
+          </p:nvPr>
+        </p:nvSpPr>
+        <p:spPr/>
+        <p:txBody>
+          <a:bodyPr/>
+          <a:lstStyle/>
+          <a:p>
+            <a:r>
+              <a:rPr lang="en-US" dirty="0"/>
+              <a:t>Questions?</a:t>
+            </a:r>
+          </a:p>
+        </p:txBody>
+      </p:sp>
+      <p:sp>
+        <p:nvSpPr>
+          <p:cNvPr id="4" name="Slide Number Placeholder 3"/>
+          <p:cNvSpPr>
+            <a:spLocks noGrp="1"/>
+          </p:cNvSpPr>
+          <p:nvPr>
+            <p:ph type="sldNum" sz="quarter" idx="5"/>
+          </p:nvPr>
+        </p:nvSpPr>
+        <p:spPr/>
+        <p:txBody>
+          <a:bodyPr/>
+          <a:lstStyle/>
+          <a:p>
+            <a:fld id="{AC55928C-CD14-454C-B617-1AFCF9A58596}" type="slidenum">
+              <a:rPr lang="en-US" smtClean="0"/>
+              <a:t>18</a:t>
+            </a:fld>
+            <a:endParaRPr lang="en-US" dirty="0"/>
+          </a:p>
+        </p:txBody>
+      </p:sp>
+    </p:spTree>
+    <p:extLst>
+      <p:ext uri="{BB962C8B-B14F-4D97-AF65-F5344CB8AC3E}">
+        <p14:creationId xmlns:p14="http://schemas.microsoft.com/office/powerpoint/2010/main" val="2404414752"/>
+      </p:ext>
+    </p:extLst>
+  </p:cSld>
+  <p:clrMapOvr>
+    <a:masterClrMapping/>
+  </p:clrMapOvr>
+</p:notes>
 </file>
 
 <file path=ppt/slideLayouts/slideLayout1.xml><?xml version="1.0" encoding="utf-8"?>
@@ -16492,7 +16579,7 @@
                 <a:latin typeface="Calibri"/>
               </a:rPr>
               <a:pPr/>
-              <a:t>7/19/21</a:t>
+              <a:t>7/21/21</a:t>
             </a:fld>
             <a:endParaRPr lang="en-US" dirty="0">
               <a:solidFill>
@@ -16745,7 +16832,7 @@
                 <a:latin typeface="Calibri"/>
               </a:rPr>
               <a:pPr/>
-              <a:t>7/19/21</a:t>
+              <a:t>7/21/21</a:t>
             </a:fld>
             <a:endParaRPr lang="en-US" dirty="0">
               <a:solidFill>
@@ -16960,7 +17047,7 @@
                 <a:latin typeface="Calibri"/>
               </a:rPr>
               <a:pPr/>
-              <a:t>7/19/21</a:t>
+              <a:t>7/21/21</a:t>
             </a:fld>
             <a:endParaRPr lang="en-US" dirty="0">
               <a:solidFill>
@@ -17244,7 +17331,7 @@
                 <a:latin typeface="Calibri"/>
               </a:rPr>
               <a:pPr/>
-              <a:t>7/19/21</a:t>
+              <a:t>7/21/21</a:t>
             </a:fld>
             <a:endParaRPr lang="en-US" dirty="0">
               <a:solidFill>
@@ -17586,7 +17673,7 @@
                 <a:latin typeface="Calibri"/>
               </a:rPr>
               <a:pPr/>
-              <a:t>7/19/21</a:t>
+              <a:t>7/21/21</a:t>
             </a:fld>
             <a:endParaRPr lang="en-US" dirty="0">
               <a:solidFill>
@@ -17914,7 +18001,7 @@
                 <a:latin typeface="Calibri"/>
               </a:rPr>
               <a:pPr/>
-              <a:t>7/19/21</a:t>
+              <a:t>7/21/21</a:t>
             </a:fld>
             <a:endParaRPr lang="en-US" dirty="0">
               <a:solidFill>
@@ -18403,7 +18490,7 @@
                 <a:latin typeface="Calibri"/>
               </a:rPr>
               <a:pPr/>
-              <a:t>7/19/21</a:t>
+              <a:t>7/21/21</a:t>
             </a:fld>
             <a:endParaRPr lang="en-US" dirty="0">
               <a:solidFill>
@@ -18586,7 +18673,7 @@
                 <a:latin typeface="Calibri"/>
               </a:rPr>
               <a:pPr/>
-              <a:t>7/19/21</a:t>
+              <a:t>7/21/21</a:t>
             </a:fld>
             <a:endParaRPr lang="en-US" dirty="0">
               <a:solidFill>
@@ -18832,7 +18919,7 @@
                 <a:latin typeface="Calibri"/>
               </a:rPr>
               <a:pPr/>
-              <a:t>7/19/21</a:t>
+              <a:t>7/21/21</a:t>
             </a:fld>
             <a:endParaRPr lang="en-US" dirty="0">
               <a:solidFill>
@@ -19174,7 +19261,7 @@
                 <a:latin typeface="Calibri"/>
               </a:rPr>
               <a:pPr/>
-              <a:t>7/19/21</a:t>
+              <a:t>7/21/21</a:t>
             </a:fld>
             <a:endParaRPr lang="en-US" dirty="0">
               <a:solidFill>
@@ -19466,7 +19553,7 @@
                 <a:latin typeface="Calibri"/>
               </a:rPr>
               <a:pPr/>
-              <a:t>7/19/21</a:t>
+              <a:t>7/21/21</a:t>
             </a:fld>
             <a:endParaRPr lang="en-US" dirty="0">
               <a:solidFill>
@@ -19716,7 +19803,7 @@
                 <a:latin typeface="Calibri"/>
               </a:rPr>
               <a:pPr defTabSz="914400"/>
-              <a:t>7/19/21</a:t>
+              <a:t>7/21/21</a:t>
             </a:fld>
             <a:endParaRPr lang="en-US" dirty="0">
               <a:solidFill>
@@ -21840,7 +21927,7 @@
         </p:xfrm>
         <a:graphic>
           <a:graphicData uri="http://schemas.openxmlformats.org/drawingml/2006/diagram">
-            <dgm:relIds xmlns:dgm="http://schemas.openxmlformats.org/drawingml/2006/diagram" xmlns:r="http://schemas.openxmlformats.org/officeDocument/2006/relationships" r:dm="rId2" r:lo="rId3" r:qs="rId4" r:cs="rId5"/>
+            <dgm:relIds xmlns:dgm="http://schemas.openxmlformats.org/drawingml/2006/diagram" xmlns:r="http://schemas.openxmlformats.org/officeDocument/2006/relationships" r:dm="rId3" r:lo="rId4" r:qs="rId5" r:cs="rId6"/>
           </a:graphicData>
         </a:graphic>
       </p:graphicFrame>
@@ -26857,13 +26944,24 @@
         <p:spPr/>
         <p:txBody>
           <a:bodyPr>
-            <a:normAutofit lnSpcReduction="10000"/>
+            <a:normAutofit fontScale="92500" lnSpcReduction="10000"/>
           </a:bodyPr>
           <a:lstStyle/>
           <a:p>
             <a:r>
               <a:rPr lang="en-US" dirty="0"/>
-              <a:t>Use After Free (UAF) challenge</a:t>
+              <a:t>Use After Free (UAF) challenge:</a:t>
+            </a:r>
+          </a:p>
+          <a:p>
+            <a:pPr lvl="1"/>
+            <a:r>
+              <a:rPr lang="en-US" i="1" dirty="0" err="1"/>
+              <a:t>vuln_classes</a:t>
+            </a:r>
+            <a:r>
+              <a:rPr lang="en-US" i="1" dirty="0"/>
+              <a:t>/exercise1</a:t>
             </a:r>
           </a:p>
           <a:p>

</xml_diff>

<commit_message>
DEF CON slides repo
- Removed content from vuln_classes and intro to malloc
- Reorganized the ordering of the bins
</commit_message>
<xml_diff>
--- a/modules/vuln_classes/vuln_classes.pptx
+++ b/modules/vuln_classes/vuln_classes.pptx
@@ -5719,186 +5719,6 @@
         </a:p>
       </dgm:t>
     </dgm:pt>
-    <dgm:pt modelId="{8C99D4DA-F6F1-44D8-A16E-DC273F22E3C0}">
-      <dgm:prSet/>
-      <dgm:spPr/>
-      <dgm:t>
-        <a:bodyPr/>
-        <a:lstStyle/>
-        <a:p>
-          <a:r>
-            <a:rPr lang="en-US" dirty="0" err="1"/>
-            <a:t>intro_to_malloc</a:t>
-          </a:r>
-          <a:r>
-            <a:rPr lang="en-US" dirty="0"/>
-            <a:t>/</a:t>
-          </a:r>
-          <a:r>
-            <a:rPr lang="en-US" dirty="0" err="1"/>
-            <a:t>double_free_playground</a:t>
-          </a:r>
-          <a:r>
-            <a:rPr lang="en-US" dirty="0"/>
-            <a:t> </a:t>
-          </a:r>
-        </a:p>
-      </dgm:t>
-    </dgm:pt>
-    <dgm:pt modelId="{1D7B1180-6627-44F7-99C4-D6B27026B5CF}" type="parTrans" cxnId="{01C48962-CAA8-436C-9EB1-1CA0F8F0A97D}">
-      <dgm:prSet/>
-      <dgm:spPr/>
-      <dgm:t>
-        <a:bodyPr/>
-        <a:lstStyle/>
-        <a:p>
-          <a:endParaRPr lang="en-US"/>
-        </a:p>
-      </dgm:t>
-    </dgm:pt>
-    <dgm:pt modelId="{3D2B9EFC-C937-4C22-873C-CED19BF8900F}" type="sibTrans" cxnId="{01C48962-CAA8-436C-9EB1-1CA0F8F0A97D}">
-      <dgm:prSet/>
-      <dgm:spPr/>
-      <dgm:t>
-        <a:bodyPr/>
-        <a:lstStyle/>
-        <a:p>
-          <a:endParaRPr lang="en-US"/>
-        </a:p>
-      </dgm:t>
-    </dgm:pt>
-    <dgm:pt modelId="{37C8108C-52B2-4892-AD09-6DECA7C5538C}">
-      <dgm:prSet/>
-      <dgm:spPr/>
-      <dgm:t>
-        <a:bodyPr/>
-        <a:lstStyle/>
-        <a:p>
-          <a:r>
-            <a:rPr lang="en-US" dirty="0"/>
-            <a:t>An assortment of double free bypass attempts</a:t>
-          </a:r>
-        </a:p>
-      </dgm:t>
-    </dgm:pt>
-    <dgm:pt modelId="{F32DE98C-F6DA-4AD6-BB0E-D0E8D50E12C3}" type="parTrans" cxnId="{B445881A-D287-42D7-9BC5-2CDB94B1BB71}">
-      <dgm:prSet/>
-      <dgm:spPr/>
-      <dgm:t>
-        <a:bodyPr/>
-        <a:lstStyle/>
-        <a:p>
-          <a:endParaRPr lang="en-US"/>
-        </a:p>
-      </dgm:t>
-    </dgm:pt>
-    <dgm:pt modelId="{A077CF9A-3D88-4455-B76A-6C8BE4A1C3F0}" type="sibTrans" cxnId="{B445881A-D287-42D7-9BC5-2CDB94B1BB71}">
-      <dgm:prSet/>
-      <dgm:spPr/>
-      <dgm:t>
-        <a:bodyPr/>
-        <a:lstStyle/>
-        <a:p>
-          <a:endParaRPr lang="en-US"/>
-        </a:p>
-      </dgm:t>
-    </dgm:pt>
-    <dgm:pt modelId="{C6D3F9C6-5031-4647-817B-FE37E59912BD}">
-      <dgm:prSet/>
-      <dgm:spPr/>
-      <dgm:t>
-        <a:bodyPr/>
-        <a:lstStyle/>
-        <a:p>
-          <a:r>
-            <a:rPr lang="en-US" dirty="0" err="1"/>
-            <a:t>Fastbin</a:t>
-          </a:r>
-          <a:r>
-            <a:rPr lang="en-US" dirty="0"/>
-            <a:t> </a:t>
-          </a:r>
-          <a:r>
-            <a:rPr lang="en-US" dirty="0" err="1"/>
-            <a:t>dupping</a:t>
-          </a:r>
-          <a:r>
-            <a:rPr lang="en-US" dirty="0"/>
-            <a:t>, </a:t>
-          </a:r>
-          <a:r>
-            <a:rPr lang="en-US" dirty="0" err="1"/>
-            <a:t>botcake</a:t>
-          </a:r>
-          <a:r>
-            <a:rPr lang="en-US" dirty="0"/>
-            <a:t>…</a:t>
-          </a:r>
-        </a:p>
-      </dgm:t>
-    </dgm:pt>
-    <dgm:pt modelId="{48A6F689-334B-DA46-BF1A-83E8DA1F960D}" type="parTrans" cxnId="{ADE1E07A-B35D-994D-95B5-5430FECE5D63}">
-      <dgm:prSet/>
-      <dgm:spPr/>
-      <dgm:t>
-        <a:bodyPr/>
-        <a:lstStyle/>
-        <a:p>
-          <a:endParaRPr lang="en-US"/>
-        </a:p>
-      </dgm:t>
-    </dgm:pt>
-    <dgm:pt modelId="{B39A4A7C-913B-BC49-953B-869C96895F58}" type="sibTrans" cxnId="{ADE1E07A-B35D-994D-95B5-5430FECE5D63}">
-      <dgm:prSet/>
-      <dgm:spPr/>
-      <dgm:t>
-        <a:bodyPr/>
-        <a:lstStyle/>
-        <a:p>
-          <a:endParaRPr lang="en-US"/>
-        </a:p>
-      </dgm:t>
-    </dgm:pt>
-    <dgm:pt modelId="{013E167E-10C4-3D40-98C9-25323369007E}">
-      <dgm:prSet/>
-      <dgm:spPr/>
-      <dgm:t>
-        <a:bodyPr/>
-        <a:lstStyle/>
-        <a:p>
-          <a:r>
-            <a:rPr lang="en-US" dirty="0" err="1"/>
-            <a:t>setup.py</a:t>
-          </a:r>
-          <a:r>
-            <a:rPr lang="en-US" dirty="0"/>
-            <a:t> 0|1|2|3|4|5 for different challenges</a:t>
-          </a:r>
-        </a:p>
-      </dgm:t>
-    </dgm:pt>
-    <dgm:pt modelId="{55A7A3DC-8DDF-504B-B60C-4805C264DB47}" type="parTrans" cxnId="{74B3E3C9-8130-DC4F-9221-109A9D690BBC}">
-      <dgm:prSet/>
-      <dgm:spPr/>
-      <dgm:t>
-        <a:bodyPr/>
-        <a:lstStyle/>
-        <a:p>
-          <a:endParaRPr lang="en-US"/>
-        </a:p>
-      </dgm:t>
-    </dgm:pt>
-    <dgm:pt modelId="{82ECF637-3AFC-F44F-B803-D170B6E3A898}" type="sibTrans" cxnId="{74B3E3C9-8130-DC4F-9221-109A9D690BBC}">
-      <dgm:prSet/>
-      <dgm:spPr/>
-      <dgm:t>
-        <a:bodyPr/>
-        <a:lstStyle/>
-        <a:p>
-          <a:endParaRPr lang="en-US"/>
-        </a:p>
-      </dgm:t>
-    </dgm:pt>
     <dgm:pt modelId="{E79FF6D8-187D-AF46-A60F-E2EC4DF3C509}">
       <dgm:prSet/>
       <dgm:spPr/>
@@ -5936,7 +5756,7 @@
       <dgm:spPr/>
     </dgm:pt>
     <dgm:pt modelId="{75781FCE-2E26-AF49-B62D-DCE486BA0144}" type="pres">
-      <dgm:prSet presAssocID="{3FF505BE-4F4D-4644-992F-78B308354C3E}" presName="parTx" presStyleLbl="alignNode1" presStyleIdx="0" presStyleCnt="2">
+      <dgm:prSet presAssocID="{3FF505BE-4F4D-4644-992F-78B308354C3E}" presName="parTx" presStyleLbl="alignNode1" presStyleIdx="0" presStyleCnt="1">
         <dgm:presLayoutVars>
           <dgm:chMax val="0"/>
           <dgm:chPref val="0"/>
@@ -5946,33 +5766,7 @@
       <dgm:spPr/>
     </dgm:pt>
     <dgm:pt modelId="{D32A4789-5DC8-464D-81D4-1C9B94C49C06}" type="pres">
-      <dgm:prSet presAssocID="{3FF505BE-4F4D-4644-992F-78B308354C3E}" presName="desTx" presStyleLbl="alignAccFollowNode1" presStyleIdx="0" presStyleCnt="2">
-        <dgm:presLayoutVars>
-          <dgm:bulletEnabled val="1"/>
-        </dgm:presLayoutVars>
-      </dgm:prSet>
-      <dgm:spPr/>
-    </dgm:pt>
-    <dgm:pt modelId="{8641971C-1D93-5541-8B01-8C06216C3B4C}" type="pres">
-      <dgm:prSet presAssocID="{B3D24208-A5E9-45E5-A217-1AA1259C3526}" presName="space" presStyleCnt="0"/>
-      <dgm:spPr/>
-    </dgm:pt>
-    <dgm:pt modelId="{6C9015A8-7B97-ED40-9490-01C51CA0436B}" type="pres">
-      <dgm:prSet presAssocID="{8C99D4DA-F6F1-44D8-A16E-DC273F22E3C0}" presName="composite" presStyleCnt="0"/>
-      <dgm:spPr/>
-    </dgm:pt>
-    <dgm:pt modelId="{43A045CE-2C43-8A46-B201-0329A58067A3}" type="pres">
-      <dgm:prSet presAssocID="{8C99D4DA-F6F1-44D8-A16E-DC273F22E3C0}" presName="parTx" presStyleLbl="alignNode1" presStyleIdx="1" presStyleCnt="2">
-        <dgm:presLayoutVars>
-          <dgm:chMax val="0"/>
-          <dgm:chPref val="0"/>
-          <dgm:bulletEnabled val="1"/>
-        </dgm:presLayoutVars>
-      </dgm:prSet>
-      <dgm:spPr/>
-    </dgm:pt>
-    <dgm:pt modelId="{62A51FD6-0B17-0749-B941-F2DDBEE84721}" type="pres">
-      <dgm:prSet presAssocID="{8C99D4DA-F6F1-44D8-A16E-DC273F22E3C0}" presName="desTx" presStyleLbl="alignAccFollowNode1" presStyleIdx="1" presStyleCnt="2">
+      <dgm:prSet presAssocID="{3FF505BE-4F4D-4644-992F-78B308354C3E}" presName="desTx" presStyleLbl="alignAccFollowNode1" presStyleIdx="0" presStyleCnt="1">
         <dgm:presLayoutVars>
           <dgm:bulletEnabled val="1"/>
         </dgm:presLayoutVars>
@@ -5981,28 +5775,16 @@
     </dgm:pt>
   </dgm:ptLst>
   <dgm:cxnLst>
-    <dgm:cxn modelId="{B445881A-D287-42D7-9BC5-2CDB94B1BB71}" srcId="{8C99D4DA-F6F1-44D8-A16E-DC273F22E3C0}" destId="{37C8108C-52B2-4892-AD09-6DECA7C5538C}" srcOrd="0" destOrd="0" parTransId="{F32DE98C-F6DA-4AD6-BB0E-D0E8D50E12C3}" sibTransId="{A077CF9A-3D88-4455-B76A-6C8BE4A1C3F0}"/>
     <dgm:cxn modelId="{4F534B22-E5DB-A94A-90D9-C32DE67BEB61}" type="presOf" srcId="{697DD12B-4CE5-4058-9E6D-EF6F5FA19E7B}" destId="{D32A4789-5DC8-464D-81D4-1C9B94C49C06}" srcOrd="0" destOrd="0" presId="urn:microsoft.com/office/officeart/2005/8/layout/hList1"/>
     <dgm:cxn modelId="{118DEF3B-DC8F-6A46-9E4A-FCB884C154FB}" type="presOf" srcId="{E79FF6D8-187D-AF46-A60F-E2EC4DF3C509}" destId="{D32A4789-5DC8-464D-81D4-1C9B94C49C06}" srcOrd="0" destOrd="1" presId="urn:microsoft.com/office/officeart/2005/8/layout/hList1"/>
     <dgm:cxn modelId="{7BDB7A3C-BB70-4803-BFB6-42BD1DA3663F}" srcId="{16427C4D-A35D-4E04-9C4D-DC5B4705E00A}" destId="{3FF505BE-4F4D-4644-992F-78B308354C3E}" srcOrd="0" destOrd="0" parTransId="{890207EB-4BB4-4B7F-9DA9-BB76C31F8D02}" sibTransId="{B3D24208-A5E9-45E5-A217-1AA1259C3526}"/>
     <dgm:cxn modelId="{5B3C4349-757D-BB45-A524-D2788EF7EBDB}" type="presOf" srcId="{3FF505BE-4F4D-4644-992F-78B308354C3E}" destId="{75781FCE-2E26-AF49-B62D-DCE486BA0144}" srcOrd="0" destOrd="0" presId="urn:microsoft.com/office/officeart/2005/8/layout/hList1"/>
     <dgm:cxn modelId="{EDD6155F-5975-4E60-A85D-9F1D6667E844}" srcId="{3FF505BE-4F4D-4644-992F-78B308354C3E}" destId="{697DD12B-4CE5-4058-9E6D-EF6F5FA19E7B}" srcOrd="0" destOrd="0" parTransId="{21B9DC31-3D43-4EAE-9029-5E14B98300CD}" sibTransId="{68E220C0-5625-4D18-903A-62140B14FA2C}"/>
-    <dgm:cxn modelId="{01C48962-CAA8-436C-9EB1-1CA0F8F0A97D}" srcId="{16427C4D-A35D-4E04-9C4D-DC5B4705E00A}" destId="{8C99D4DA-F6F1-44D8-A16E-DC273F22E3C0}" srcOrd="1" destOrd="0" parTransId="{1D7B1180-6627-44F7-99C4-D6B27026B5CF}" sibTransId="{3D2B9EFC-C937-4C22-873C-CED19BF8900F}"/>
-    <dgm:cxn modelId="{96AF4573-F9BC-054B-9716-B25B3E41EB75}" type="presOf" srcId="{8C99D4DA-F6F1-44D8-A16E-DC273F22E3C0}" destId="{43A045CE-2C43-8A46-B201-0329A58067A3}" srcOrd="0" destOrd="0" presId="urn:microsoft.com/office/officeart/2005/8/layout/hList1"/>
-    <dgm:cxn modelId="{ADE1E07A-B35D-994D-95B5-5430FECE5D63}" srcId="{8C99D4DA-F6F1-44D8-A16E-DC273F22E3C0}" destId="{C6D3F9C6-5031-4647-817B-FE37E59912BD}" srcOrd="2" destOrd="0" parTransId="{48A6F689-334B-DA46-BF1A-83E8DA1F960D}" sibTransId="{B39A4A7C-913B-BC49-953B-869C96895F58}"/>
-    <dgm:cxn modelId="{70787E99-85C7-D749-9DD4-EBB585845C72}" type="presOf" srcId="{013E167E-10C4-3D40-98C9-25323369007E}" destId="{62A51FD6-0B17-0749-B941-F2DDBEE84721}" srcOrd="0" destOrd="1" presId="urn:microsoft.com/office/officeart/2005/8/layout/hList1"/>
-    <dgm:cxn modelId="{60F09DB1-670C-9441-BAF3-C22A6206E9BF}" type="presOf" srcId="{C6D3F9C6-5031-4647-817B-FE37E59912BD}" destId="{62A51FD6-0B17-0749-B941-F2DDBEE84721}" srcOrd="0" destOrd="2" presId="urn:microsoft.com/office/officeart/2005/8/layout/hList1"/>
-    <dgm:cxn modelId="{74B3E3C9-8130-DC4F-9221-109A9D690BBC}" srcId="{8C99D4DA-F6F1-44D8-A16E-DC273F22E3C0}" destId="{013E167E-10C4-3D40-98C9-25323369007E}" srcOrd="1" destOrd="0" parTransId="{55A7A3DC-8DDF-504B-B60C-4805C264DB47}" sibTransId="{82ECF637-3AFC-F44F-B803-D170B6E3A898}"/>
     <dgm:cxn modelId="{EBB0B2D4-898F-C84F-99CE-9775F564480C}" srcId="{3FF505BE-4F4D-4644-992F-78B308354C3E}" destId="{E79FF6D8-187D-AF46-A60F-E2EC4DF3C509}" srcOrd="1" destOrd="0" parTransId="{0B4032E5-02FC-4047-A7EE-95FCAD7B4752}" sibTransId="{E8FAD286-C5BF-BC48-882C-56BE2A151573}"/>
     <dgm:cxn modelId="{54D66BEF-E886-8944-82FD-434BB9A42CB7}" type="presOf" srcId="{16427C4D-A35D-4E04-9C4D-DC5B4705E00A}" destId="{EBFFBBF2-1DDC-FE44-B2F0-0AF2177E35B8}" srcOrd="0" destOrd="0" presId="urn:microsoft.com/office/officeart/2005/8/layout/hList1"/>
-    <dgm:cxn modelId="{2DEEFDF1-EA30-BD40-950C-772A789B5E4F}" type="presOf" srcId="{37C8108C-52B2-4892-AD09-6DECA7C5538C}" destId="{62A51FD6-0B17-0749-B941-F2DDBEE84721}" srcOrd="0" destOrd="0" presId="urn:microsoft.com/office/officeart/2005/8/layout/hList1"/>
     <dgm:cxn modelId="{634F0FC8-317F-DE41-A822-165AF1B6FBC4}" type="presParOf" srcId="{EBFFBBF2-1DDC-FE44-B2F0-0AF2177E35B8}" destId="{59537E7E-BB06-ED46-8288-6B7CA909F2E1}" srcOrd="0" destOrd="0" presId="urn:microsoft.com/office/officeart/2005/8/layout/hList1"/>
     <dgm:cxn modelId="{3437946B-94A5-244D-9904-6B8FC81D130A}" type="presParOf" srcId="{59537E7E-BB06-ED46-8288-6B7CA909F2E1}" destId="{75781FCE-2E26-AF49-B62D-DCE486BA0144}" srcOrd="0" destOrd="0" presId="urn:microsoft.com/office/officeart/2005/8/layout/hList1"/>
     <dgm:cxn modelId="{2CFB0FD0-16FA-614B-A1F9-BF1E35CC55D7}" type="presParOf" srcId="{59537E7E-BB06-ED46-8288-6B7CA909F2E1}" destId="{D32A4789-5DC8-464D-81D4-1C9B94C49C06}" srcOrd="1" destOrd="0" presId="urn:microsoft.com/office/officeart/2005/8/layout/hList1"/>
-    <dgm:cxn modelId="{8F867E51-8A56-5A4B-930E-9D2EC4A25841}" type="presParOf" srcId="{EBFFBBF2-1DDC-FE44-B2F0-0AF2177E35B8}" destId="{8641971C-1D93-5541-8B01-8C06216C3B4C}" srcOrd="1" destOrd="0" presId="urn:microsoft.com/office/officeart/2005/8/layout/hList1"/>
-    <dgm:cxn modelId="{0DD04B2E-5070-844E-B8FA-CF9F39F3317C}" type="presParOf" srcId="{EBFFBBF2-1DDC-FE44-B2F0-0AF2177E35B8}" destId="{6C9015A8-7B97-ED40-9490-01C51CA0436B}" srcOrd="2" destOrd="0" presId="urn:microsoft.com/office/officeart/2005/8/layout/hList1"/>
-    <dgm:cxn modelId="{BEFF38BA-EE86-CB4C-8640-AA0FCF2B4CFB}" type="presParOf" srcId="{6C9015A8-7B97-ED40-9490-01C51CA0436B}" destId="{43A045CE-2C43-8A46-B201-0329A58067A3}" srcOrd="0" destOrd="0" presId="urn:microsoft.com/office/officeart/2005/8/layout/hList1"/>
-    <dgm:cxn modelId="{B418EB34-6D87-474C-BC5F-858EC2BE954C}" type="presParOf" srcId="{6C9015A8-7B97-ED40-9490-01C51CA0436B}" destId="{62A51FD6-0B17-0749-B941-F2DDBEE84721}" srcOrd="1" destOrd="0" presId="urn:microsoft.com/office/officeart/2005/8/layout/hList1"/>
   </dgm:cxnLst>
   <dgm:bg/>
   <dgm:whole/>
@@ -7797,8 +7579,8 @@
       </dsp:nvSpPr>
       <dsp:spPr>
         <a:xfrm>
-          <a:off x="38" y="692112"/>
-          <a:ext cx="3685337" cy="460800"/>
+          <a:off x="0" y="7071"/>
+          <a:ext cx="7886700" cy="921600"/>
         </a:xfrm>
         <a:prstGeom prst="rect">
           <a:avLst/>
@@ -7840,12 +7622,12 @@
         </a:fontRef>
       </dsp:style>
       <dsp:txBody>
-        <a:bodyPr spcFirstLastPara="0" vert="horz" wrap="square" lIns="113792" tIns="65024" rIns="113792" bIns="65024" numCol="1" spcCol="1270" anchor="ctr" anchorCtr="0">
+        <a:bodyPr spcFirstLastPara="0" vert="horz" wrap="square" lIns="227584" tIns="130048" rIns="227584" bIns="130048" numCol="1" spcCol="1270" anchor="ctr" anchorCtr="0">
           <a:noAutofit/>
         </a:bodyPr>
         <a:lstStyle/>
         <a:p>
-          <a:pPr marL="0" lvl="0" indent="0" algn="ctr" defTabSz="711200">
+          <a:pPr marL="0" lvl="0" indent="0" algn="ctr" defTabSz="1422400">
             <a:lnSpc>
               <a:spcPct val="90000"/>
             </a:lnSpc>
@@ -7858,14 +7640,14 @@
             <a:buNone/>
           </a:pPr>
           <a:r>
-            <a:rPr lang="en-US" sz="1600" kern="1200" dirty="0"/>
+            <a:rPr lang="en-US" sz="3200" kern="1200" dirty="0"/>
             <a:t>Will not have challenges on these directly</a:t>
           </a:r>
         </a:p>
       </dsp:txBody>
       <dsp:txXfrm>
-        <a:off x="38" y="692112"/>
-        <a:ext cx="3685337" cy="460800"/>
+        <a:off x="0" y="7071"/>
+        <a:ext cx="7886700" cy="921600"/>
       </dsp:txXfrm>
     </dsp:sp>
     <dsp:sp modelId="{D32A4789-5DC8-464D-81D4-1C9B94C49C06}">
@@ -7875,8 +7657,8 @@
       </dsp:nvSpPr>
       <dsp:spPr>
         <a:xfrm>
-          <a:off x="38" y="1152912"/>
-          <a:ext cx="3685337" cy="1418478"/>
+          <a:off x="0" y="928671"/>
+          <a:ext cx="7886700" cy="2327760"/>
         </a:xfrm>
         <a:prstGeom prst="rect">
           <a:avLst/>
@@ -7920,12 +7702,12 @@
         <a:fontRef idx="minor"/>
       </dsp:style>
       <dsp:txBody>
-        <a:bodyPr spcFirstLastPara="0" vert="horz" wrap="square" lIns="85344" tIns="85344" rIns="113792" bIns="128016" numCol="1" spcCol="1270" anchor="t" anchorCtr="0">
+        <a:bodyPr spcFirstLastPara="0" vert="horz" wrap="square" lIns="170688" tIns="170688" rIns="227584" bIns="256032" numCol="1" spcCol="1270" anchor="t" anchorCtr="0">
           <a:noAutofit/>
         </a:bodyPr>
         <a:lstStyle/>
         <a:p>
-          <a:pPr marL="171450" lvl="1" indent="-171450" algn="l" defTabSz="711200">
+          <a:pPr marL="285750" lvl="1" indent="-285750" algn="l" defTabSz="1422400">
             <a:lnSpc>
               <a:spcPct val="90000"/>
             </a:lnSpc>
@@ -7938,12 +7720,12 @@
             <a:buChar char="•"/>
           </a:pPr>
           <a:r>
-            <a:rPr lang="en-US" sz="1600" kern="1200" dirty="0"/>
+            <a:rPr lang="en-US" sz="3200" kern="1200" dirty="0"/>
             <a:t>Bug class protection as opposed to a technique</a:t>
           </a:r>
         </a:p>
         <a:p>
-          <a:pPr marL="171450" lvl="1" indent="-171450" algn="l" defTabSz="711200">
+          <a:pPr marL="285750" lvl="1" indent="-285750" algn="l" defTabSz="1422400">
             <a:lnSpc>
               <a:spcPct val="90000"/>
             </a:lnSpc>
@@ -7956,244 +7738,14 @@
             <a:buChar char="•"/>
           </a:pPr>
           <a:r>
-            <a:rPr lang="en-US" sz="1600" kern="1200" dirty="0"/>
+            <a:rPr lang="en-US" sz="3200" kern="1200" dirty="0"/>
             <a:t>Will sprinkle in bypasses for double free when it feels appropriate though</a:t>
           </a:r>
         </a:p>
       </dsp:txBody>
       <dsp:txXfrm>
-        <a:off x="38" y="1152912"/>
-        <a:ext cx="3685337" cy="1418478"/>
-      </dsp:txXfrm>
-    </dsp:sp>
-    <dsp:sp modelId="{43A045CE-2C43-8A46-B201-0329A58067A3}">
-      <dsp:nvSpPr>
-        <dsp:cNvPr id="0" name=""/>
-        <dsp:cNvSpPr/>
-      </dsp:nvSpPr>
-      <dsp:spPr>
-        <a:xfrm>
-          <a:off x="4201323" y="692112"/>
-          <a:ext cx="3685337" cy="460800"/>
-        </a:xfrm>
-        <a:prstGeom prst="rect">
-          <a:avLst/>
-        </a:prstGeom>
-        <a:solidFill>
-          <a:schemeClr val="accent1">
-            <a:hueOff val="0"/>
-            <a:satOff val="0"/>
-            <a:lumOff val="0"/>
-            <a:alphaOff val="0"/>
-          </a:schemeClr>
-        </a:solidFill>
-        <a:ln w="12700" cap="flat" cmpd="sng" algn="ctr">
-          <a:solidFill>
-            <a:schemeClr val="accent1">
-              <a:hueOff val="0"/>
-              <a:satOff val="0"/>
-              <a:lumOff val="0"/>
-              <a:alphaOff val="0"/>
-            </a:schemeClr>
-          </a:solidFill>
-          <a:prstDash val="solid"/>
-          <a:miter lim="800000"/>
-        </a:ln>
-        <a:effectLst/>
-      </dsp:spPr>
-      <dsp:style>
-        <a:lnRef idx="2">
-          <a:scrgbClr r="0" g="0" b="0"/>
-        </a:lnRef>
-        <a:fillRef idx="1">
-          <a:scrgbClr r="0" g="0" b="0"/>
-        </a:fillRef>
-        <a:effectRef idx="0">
-          <a:scrgbClr r="0" g="0" b="0"/>
-        </a:effectRef>
-        <a:fontRef idx="minor">
-          <a:schemeClr val="lt1"/>
-        </a:fontRef>
-      </dsp:style>
-      <dsp:txBody>
-        <a:bodyPr spcFirstLastPara="0" vert="horz" wrap="square" lIns="113792" tIns="65024" rIns="113792" bIns="65024" numCol="1" spcCol="1270" anchor="ctr" anchorCtr="0">
-          <a:noAutofit/>
-        </a:bodyPr>
-        <a:lstStyle/>
-        <a:p>
-          <a:pPr marL="0" lvl="0" indent="0" algn="ctr" defTabSz="711200">
-            <a:lnSpc>
-              <a:spcPct val="90000"/>
-            </a:lnSpc>
-            <a:spcBef>
-              <a:spcPct val="0"/>
-            </a:spcBef>
-            <a:spcAft>
-              <a:spcPct val="35000"/>
-            </a:spcAft>
-            <a:buNone/>
-          </a:pPr>
-          <a:r>
-            <a:rPr lang="en-US" sz="1600" kern="1200" dirty="0" err="1"/>
-            <a:t>intro_to_malloc</a:t>
-          </a:r>
-          <a:r>
-            <a:rPr lang="en-US" sz="1600" kern="1200" dirty="0"/>
-            <a:t>/</a:t>
-          </a:r>
-          <a:r>
-            <a:rPr lang="en-US" sz="1600" kern="1200" dirty="0" err="1"/>
-            <a:t>double_free_playground</a:t>
-          </a:r>
-          <a:r>
-            <a:rPr lang="en-US" sz="1600" kern="1200" dirty="0"/>
-            <a:t> </a:t>
-          </a:r>
-        </a:p>
-      </dsp:txBody>
-      <dsp:txXfrm>
-        <a:off x="4201323" y="692112"/>
-        <a:ext cx="3685337" cy="460800"/>
-      </dsp:txXfrm>
-    </dsp:sp>
-    <dsp:sp modelId="{62A51FD6-0B17-0749-B941-F2DDBEE84721}">
-      <dsp:nvSpPr>
-        <dsp:cNvPr id="0" name=""/>
-        <dsp:cNvSpPr/>
-      </dsp:nvSpPr>
-      <dsp:spPr>
-        <a:xfrm>
-          <a:off x="4201323" y="1152912"/>
-          <a:ext cx="3685337" cy="1418478"/>
-        </a:xfrm>
-        <a:prstGeom prst="rect">
-          <a:avLst/>
-        </a:prstGeom>
-        <a:solidFill>
-          <a:schemeClr val="accent1">
-            <a:alpha val="90000"/>
-            <a:tint val="40000"/>
-            <a:hueOff val="0"/>
-            <a:satOff val="0"/>
-            <a:lumOff val="0"/>
-            <a:alphaOff val="0"/>
-          </a:schemeClr>
-        </a:solidFill>
-        <a:ln w="12700" cap="flat" cmpd="sng" algn="ctr">
-          <a:solidFill>
-            <a:schemeClr val="accent1">
-              <a:alpha val="90000"/>
-              <a:tint val="40000"/>
-              <a:hueOff val="0"/>
-              <a:satOff val="0"/>
-              <a:lumOff val="0"/>
-              <a:alphaOff val="0"/>
-            </a:schemeClr>
-          </a:solidFill>
-          <a:prstDash val="solid"/>
-          <a:miter lim="800000"/>
-        </a:ln>
-        <a:effectLst/>
-      </dsp:spPr>
-      <dsp:style>
-        <a:lnRef idx="2">
-          <a:scrgbClr r="0" g="0" b="0"/>
-        </a:lnRef>
-        <a:fillRef idx="1">
-          <a:scrgbClr r="0" g="0" b="0"/>
-        </a:fillRef>
-        <a:effectRef idx="0">
-          <a:scrgbClr r="0" g="0" b="0"/>
-        </a:effectRef>
-        <a:fontRef idx="minor"/>
-      </dsp:style>
-      <dsp:txBody>
-        <a:bodyPr spcFirstLastPara="0" vert="horz" wrap="square" lIns="85344" tIns="85344" rIns="113792" bIns="128016" numCol="1" spcCol="1270" anchor="t" anchorCtr="0">
-          <a:noAutofit/>
-        </a:bodyPr>
-        <a:lstStyle/>
-        <a:p>
-          <a:pPr marL="171450" lvl="1" indent="-171450" algn="l" defTabSz="711200">
-            <a:lnSpc>
-              <a:spcPct val="90000"/>
-            </a:lnSpc>
-            <a:spcBef>
-              <a:spcPct val="0"/>
-            </a:spcBef>
-            <a:spcAft>
-              <a:spcPct val="15000"/>
-            </a:spcAft>
-            <a:buChar char="•"/>
-          </a:pPr>
-          <a:r>
-            <a:rPr lang="en-US" sz="1600" kern="1200" dirty="0"/>
-            <a:t>An assortment of double free bypass attempts</a:t>
-          </a:r>
-        </a:p>
-        <a:p>
-          <a:pPr marL="171450" lvl="1" indent="-171450" algn="l" defTabSz="711200">
-            <a:lnSpc>
-              <a:spcPct val="90000"/>
-            </a:lnSpc>
-            <a:spcBef>
-              <a:spcPct val="0"/>
-            </a:spcBef>
-            <a:spcAft>
-              <a:spcPct val="15000"/>
-            </a:spcAft>
-            <a:buChar char="•"/>
-          </a:pPr>
-          <a:r>
-            <a:rPr lang="en-US" sz="1600" kern="1200" dirty="0" err="1"/>
-            <a:t>setup.py</a:t>
-          </a:r>
-          <a:r>
-            <a:rPr lang="en-US" sz="1600" kern="1200" dirty="0"/>
-            <a:t> 0|1|2|3|4|5 for different challenges</a:t>
-          </a:r>
-        </a:p>
-        <a:p>
-          <a:pPr marL="171450" lvl="1" indent="-171450" algn="l" defTabSz="711200">
-            <a:lnSpc>
-              <a:spcPct val="90000"/>
-            </a:lnSpc>
-            <a:spcBef>
-              <a:spcPct val="0"/>
-            </a:spcBef>
-            <a:spcAft>
-              <a:spcPct val="15000"/>
-            </a:spcAft>
-            <a:buChar char="•"/>
-          </a:pPr>
-          <a:r>
-            <a:rPr lang="en-US" sz="1600" kern="1200" dirty="0" err="1"/>
-            <a:t>Fastbin</a:t>
-          </a:r>
-          <a:r>
-            <a:rPr lang="en-US" sz="1600" kern="1200" dirty="0"/>
-            <a:t> </a:t>
-          </a:r>
-          <a:r>
-            <a:rPr lang="en-US" sz="1600" kern="1200" dirty="0" err="1"/>
-            <a:t>dupping</a:t>
-          </a:r>
-          <a:r>
-            <a:rPr lang="en-US" sz="1600" kern="1200" dirty="0"/>
-            <a:t>, </a:t>
-          </a:r>
-          <a:r>
-            <a:rPr lang="en-US" sz="1600" kern="1200" dirty="0" err="1"/>
-            <a:t>botcake</a:t>
-          </a:r>
-          <a:r>
-            <a:rPr lang="en-US" sz="1600" kern="1200" dirty="0"/>
-            <a:t>…</a:t>
-          </a:r>
-        </a:p>
-      </dsp:txBody>
-      <dsp:txXfrm>
-        <a:off x="4201323" y="1152912"/>
-        <a:ext cx="3685337" cy="1418478"/>
+        <a:off x="0" y="928671"/>
+        <a:ext cx="7886700" cy="2327760"/>
       </dsp:txXfrm>
     </dsp:sp>
   </dsp:spTree>
@@ -16022,7 +15574,7 @@
           <a:p>
             <a:fld id="{2DA23E8D-1792-1541-9147-970A8DD8A355}" type="datetimeFigureOut">
               <a:rPr lang="en-US" smtClean="0"/>
-              <a:t>7/21/21</a:t>
+              <a:t>7/23/21</a:t>
             </a:fld>
             <a:endParaRPr lang="en-US" dirty="0"/>
           </a:p>
@@ -16335,6 +15887,177 @@
           <a:p>
             <a:r>
               <a:rPr lang="en-US" dirty="0"/>
+              <a:t>Example of RIP of stack. But, instead, we are able to overwrite metadata on the heap</a:t>
+            </a:r>
+          </a:p>
+        </p:txBody>
+      </p:sp>
+      <p:sp>
+        <p:nvSpPr>
+          <p:cNvPr id="4" name="Slide Number Placeholder 3"/>
+          <p:cNvSpPr>
+            <a:spLocks noGrp="1"/>
+          </p:cNvSpPr>
+          <p:nvPr>
+            <p:ph type="sldNum" sz="quarter" idx="5"/>
+          </p:nvPr>
+        </p:nvSpPr>
+        <p:spPr/>
+        <p:txBody>
+          <a:bodyPr/>
+          <a:lstStyle/>
+          <a:p>
+            <a:fld id="{AC55928C-CD14-454C-B617-1AFCF9A58596}" type="slidenum">
+              <a:rPr lang="en-US" smtClean="0"/>
+              <a:t>2</a:t>
+            </a:fld>
+            <a:endParaRPr lang="en-US" dirty="0"/>
+          </a:p>
+        </p:txBody>
+      </p:sp>
+    </p:spTree>
+    <p:extLst>
+      <p:ext uri="{BB962C8B-B14F-4D97-AF65-F5344CB8AC3E}">
+        <p14:creationId xmlns:p14="http://schemas.microsoft.com/office/powerpoint/2010/main" val="311369736"/>
+      </p:ext>
+    </p:extLst>
+  </p:cSld>
+  <p:clrMapOvr>
+    <a:masterClrMapping/>
+  </p:clrMapOvr>
+</p:notes>
+</file>
+
+<file path=ppt/notesSlides/notesSlide2.xml><?xml version="1.0" encoding="utf-8"?>
+<p:notes xmlns:a="http://schemas.openxmlformats.org/drawingml/2006/main" xmlns:r="http://schemas.openxmlformats.org/officeDocument/2006/relationships" xmlns:p="http://schemas.openxmlformats.org/presentationml/2006/main">
+  <p:cSld>
+    <p:spTree>
+      <p:nvGrpSpPr>
+        <p:cNvPr id="1" name=""/>
+        <p:cNvGrpSpPr/>
+        <p:nvPr/>
+      </p:nvGrpSpPr>
+      <p:grpSpPr>
+        <a:xfrm>
+          <a:off x="0" y="0"/>
+          <a:ext cx="0" cy="0"/>
+          <a:chOff x="0" y="0"/>
+          <a:chExt cx="0" cy="0"/>
+        </a:xfrm>
+      </p:grpSpPr>
+      <p:sp>
+        <p:nvSpPr>
+          <p:cNvPr id="2" name="Slide Image Placeholder 1"/>
+          <p:cNvSpPr>
+            <a:spLocks noGrp="1" noRot="1" noChangeAspect="1"/>
+          </p:cNvSpPr>
+          <p:nvPr>
+            <p:ph type="sldImg"/>
+          </p:nvPr>
+        </p:nvSpPr>
+        <p:spPr/>
+      </p:sp>
+      <p:sp>
+        <p:nvSpPr>
+          <p:cNvPr id="3" name="Notes Placeholder 2"/>
+          <p:cNvSpPr>
+            <a:spLocks noGrp="1"/>
+          </p:cNvSpPr>
+          <p:nvPr>
+            <p:ph type="body" idx="1"/>
+          </p:nvPr>
+        </p:nvSpPr>
+        <p:spPr/>
+        <p:txBody>
+          <a:bodyPr/>
+          <a:lstStyle/>
+          <a:p>
+            <a:endParaRPr lang="en-US" dirty="0"/>
+          </a:p>
+        </p:txBody>
+      </p:sp>
+      <p:sp>
+        <p:nvSpPr>
+          <p:cNvPr id="4" name="Slide Number Placeholder 3"/>
+          <p:cNvSpPr>
+            <a:spLocks noGrp="1"/>
+          </p:cNvSpPr>
+          <p:nvPr>
+            <p:ph type="sldNum" sz="quarter" idx="5"/>
+          </p:nvPr>
+        </p:nvSpPr>
+        <p:spPr/>
+        <p:txBody>
+          <a:bodyPr/>
+          <a:lstStyle/>
+          <a:p>
+            <a:fld id="{AC55928C-CD14-454C-B617-1AFCF9A58596}" type="slidenum">
+              <a:rPr lang="en-US" smtClean="0"/>
+              <a:t>4</a:t>
+            </a:fld>
+            <a:endParaRPr lang="en-US" dirty="0"/>
+          </a:p>
+        </p:txBody>
+      </p:sp>
+    </p:spTree>
+    <p:extLst>
+      <p:ext uri="{BB962C8B-B14F-4D97-AF65-F5344CB8AC3E}">
+        <p14:creationId xmlns:p14="http://schemas.microsoft.com/office/powerpoint/2010/main" val="3099922480"/>
+      </p:ext>
+    </p:extLst>
+  </p:cSld>
+  <p:clrMapOvr>
+    <a:masterClrMapping/>
+  </p:clrMapOvr>
+</p:notes>
+</file>
+
+<file path=ppt/notesSlides/notesSlide3.xml><?xml version="1.0" encoding="utf-8"?>
+<p:notes xmlns:a="http://schemas.openxmlformats.org/drawingml/2006/main" xmlns:r="http://schemas.openxmlformats.org/officeDocument/2006/relationships" xmlns:p="http://schemas.openxmlformats.org/presentationml/2006/main">
+  <p:cSld>
+    <p:spTree>
+      <p:nvGrpSpPr>
+        <p:cNvPr id="1" name=""/>
+        <p:cNvGrpSpPr/>
+        <p:nvPr/>
+      </p:nvGrpSpPr>
+      <p:grpSpPr>
+        <a:xfrm>
+          <a:off x="0" y="0"/>
+          <a:ext cx="0" cy="0"/>
+          <a:chOff x="0" y="0"/>
+          <a:chExt cx="0" cy="0"/>
+        </a:xfrm>
+      </p:grpSpPr>
+      <p:sp>
+        <p:nvSpPr>
+          <p:cNvPr id="2" name="Slide Image Placeholder 1"/>
+          <p:cNvSpPr>
+            <a:spLocks noGrp="1" noRot="1" noChangeAspect="1"/>
+          </p:cNvSpPr>
+          <p:nvPr>
+            <p:ph type="sldImg"/>
+          </p:nvPr>
+        </p:nvSpPr>
+        <p:spPr/>
+      </p:sp>
+      <p:sp>
+        <p:nvSpPr>
+          <p:cNvPr id="3" name="Notes Placeholder 2"/>
+          <p:cNvSpPr>
+            <a:spLocks noGrp="1"/>
+          </p:cNvSpPr>
+          <p:nvPr>
+            <p:ph type="body" idx="1"/>
+          </p:nvPr>
+        </p:nvSpPr>
+        <p:spPr/>
+        <p:txBody>
+          <a:bodyPr/>
+          <a:lstStyle/>
+          <a:p>
+            <a:r>
+              <a:rPr lang="en-US" dirty="0"/>
               <a:t>Questions?</a:t>
             </a:r>
           </a:p>
@@ -16579,7 +16302,7 @@
                 <a:latin typeface="Calibri"/>
               </a:rPr>
               <a:pPr/>
-              <a:t>7/21/21</a:t>
+              <a:t>7/23/21</a:t>
             </a:fld>
             <a:endParaRPr lang="en-US" dirty="0">
               <a:solidFill>
@@ -16832,7 +16555,7 @@
                 <a:latin typeface="Calibri"/>
               </a:rPr>
               <a:pPr/>
-              <a:t>7/21/21</a:t>
+              <a:t>7/23/21</a:t>
             </a:fld>
             <a:endParaRPr lang="en-US" dirty="0">
               <a:solidFill>
@@ -17047,7 +16770,7 @@
                 <a:latin typeface="Calibri"/>
               </a:rPr>
               <a:pPr/>
-              <a:t>7/21/21</a:t>
+              <a:t>7/23/21</a:t>
             </a:fld>
             <a:endParaRPr lang="en-US" dirty="0">
               <a:solidFill>
@@ -17331,7 +17054,7 @@
                 <a:latin typeface="Calibri"/>
               </a:rPr>
               <a:pPr/>
-              <a:t>7/21/21</a:t>
+              <a:t>7/23/21</a:t>
             </a:fld>
             <a:endParaRPr lang="en-US" dirty="0">
               <a:solidFill>
@@ -17673,7 +17396,7 @@
                 <a:latin typeface="Calibri"/>
               </a:rPr>
               <a:pPr/>
-              <a:t>7/21/21</a:t>
+              <a:t>7/23/21</a:t>
             </a:fld>
             <a:endParaRPr lang="en-US" dirty="0">
               <a:solidFill>
@@ -18001,7 +17724,7 @@
                 <a:latin typeface="Calibri"/>
               </a:rPr>
               <a:pPr/>
-              <a:t>7/21/21</a:t>
+              <a:t>7/23/21</a:t>
             </a:fld>
             <a:endParaRPr lang="en-US" dirty="0">
               <a:solidFill>
@@ -18490,7 +18213,7 @@
                 <a:latin typeface="Calibri"/>
               </a:rPr>
               <a:pPr/>
-              <a:t>7/21/21</a:t>
+              <a:t>7/23/21</a:t>
             </a:fld>
             <a:endParaRPr lang="en-US" dirty="0">
               <a:solidFill>
@@ -18673,7 +18396,7 @@
                 <a:latin typeface="Calibri"/>
               </a:rPr>
               <a:pPr/>
-              <a:t>7/21/21</a:t>
+              <a:t>7/23/21</a:t>
             </a:fld>
             <a:endParaRPr lang="en-US" dirty="0">
               <a:solidFill>
@@ -18919,7 +18642,7 @@
                 <a:latin typeface="Calibri"/>
               </a:rPr>
               <a:pPr/>
-              <a:t>7/21/21</a:t>
+              <a:t>7/23/21</a:t>
             </a:fld>
             <a:endParaRPr lang="en-US" dirty="0">
               <a:solidFill>
@@ -19261,7 +18984,7 @@
                 <a:latin typeface="Calibri"/>
               </a:rPr>
               <a:pPr/>
-              <a:t>7/21/21</a:t>
+              <a:t>7/23/21</a:t>
             </a:fld>
             <a:endParaRPr lang="en-US" dirty="0">
               <a:solidFill>
@@ -19553,7 +19276,7 @@
                 <a:latin typeface="Calibri"/>
               </a:rPr>
               <a:pPr/>
-              <a:t>7/21/21</a:t>
+              <a:t>7/23/21</a:t>
             </a:fld>
             <a:endParaRPr lang="en-US" dirty="0">
               <a:solidFill>
@@ -19803,7 +19526,7 @@
                 <a:latin typeface="Calibri"/>
               </a:rPr>
               <a:pPr defTabSz="914400"/>
-              <a:t>7/21/21</a:t>
+              <a:t>7/23/21</a:t>
             </a:fld>
             <a:endParaRPr lang="en-US" dirty="0">
               <a:solidFill>
@@ -22201,10 +21924,10 @@
           <p:nvPr/>
         </p:nvPicPr>
         <p:blipFill>
-          <a:blip r:embed="rId2">
+          <a:blip r:embed="rId3">
             <a:extLst>
               <a:ext uri="{96DAC541-7B7A-43D3-8B79-37D633B846F1}">
-                <asvg:svgBlip xmlns:asvg="http://schemas.microsoft.com/office/drawing/2016/SVG/main" r:embed="rId3"/>
+                <asvg:svgBlip xmlns:asvg="http://schemas.microsoft.com/office/drawing/2016/SVG/main" r:embed="rId4"/>
               </a:ext>
             </a:extLst>
           </a:blip>
@@ -22817,7 +22540,7 @@
 </file>
 
 <file path=ppt/slides/slide23.xml><?xml version="1.0" encoding="utf-8"?>
-<p:sld xmlns:a="http://schemas.openxmlformats.org/drawingml/2006/main" xmlns:r="http://schemas.openxmlformats.org/officeDocument/2006/relationships" xmlns:p="http://schemas.openxmlformats.org/presentationml/2006/main">
+<p:sld xmlns:a="http://schemas.openxmlformats.org/drawingml/2006/main" xmlns:r="http://schemas.openxmlformats.org/officeDocument/2006/relationships" xmlns:p="http://schemas.openxmlformats.org/presentationml/2006/main" show="0">
   <p:cSld>
     <p:spTree>
       <p:nvGrpSpPr>
@@ -23032,7 +22755,7 @@
 </file>
 
 <file path=ppt/slides/slide24.xml><?xml version="1.0" encoding="utf-8"?>
-<p:sld xmlns:a="http://schemas.openxmlformats.org/drawingml/2006/main" xmlns:r="http://schemas.openxmlformats.org/officeDocument/2006/relationships" xmlns:p="http://schemas.openxmlformats.org/presentationml/2006/main">
+<p:sld xmlns:a="http://schemas.openxmlformats.org/drawingml/2006/main" xmlns:r="http://schemas.openxmlformats.org/officeDocument/2006/relationships" xmlns:p="http://schemas.openxmlformats.org/presentationml/2006/main" show="0">
   <p:cSld>
     <p:spTree>
       <p:nvGrpSpPr>
@@ -23163,7 +22886,7 @@
 </file>
 
 <file path=ppt/slides/slide25.xml><?xml version="1.0" encoding="utf-8"?>
-<p:sld xmlns:a="http://schemas.openxmlformats.org/drawingml/2006/main" xmlns:r="http://schemas.openxmlformats.org/officeDocument/2006/relationships" xmlns:p="http://schemas.openxmlformats.org/presentationml/2006/main">
+<p:sld xmlns:a="http://schemas.openxmlformats.org/drawingml/2006/main" xmlns:r="http://schemas.openxmlformats.org/officeDocument/2006/relationships" xmlns:p="http://schemas.openxmlformats.org/presentationml/2006/main" show="0">
   <p:cSld>
     <p:spTree>
       <p:nvGrpSpPr>
@@ -23307,7 +23030,7 @@
 </file>
 
 <file path=ppt/slides/slide26.xml><?xml version="1.0" encoding="utf-8"?>
-<p:sld xmlns:a="http://schemas.openxmlformats.org/drawingml/2006/main" xmlns:r="http://schemas.openxmlformats.org/officeDocument/2006/relationships" xmlns:p="http://schemas.openxmlformats.org/presentationml/2006/main">
+<p:sld xmlns:a="http://schemas.openxmlformats.org/drawingml/2006/main" xmlns:r="http://schemas.openxmlformats.org/officeDocument/2006/relationships" xmlns:p="http://schemas.openxmlformats.org/presentationml/2006/main" show="0">
   <p:cSld>
     <p:spTree>
       <p:nvGrpSpPr>
@@ -23451,7 +23174,7 @@
 </file>
 
 <file path=ppt/slides/slide27.xml><?xml version="1.0" encoding="utf-8"?>
-<p:sld xmlns:a="http://schemas.openxmlformats.org/drawingml/2006/main" xmlns:r="http://schemas.openxmlformats.org/officeDocument/2006/relationships" xmlns:p="http://schemas.openxmlformats.org/presentationml/2006/main">
+<p:sld xmlns:a="http://schemas.openxmlformats.org/drawingml/2006/main" xmlns:r="http://schemas.openxmlformats.org/officeDocument/2006/relationships" xmlns:p="http://schemas.openxmlformats.org/presentationml/2006/main" show="0">
   <p:cSld>
     <p:spTree>
       <p:nvGrpSpPr>
@@ -23607,7 +23330,7 @@
 </file>
 
 <file path=ppt/slides/slide28.xml><?xml version="1.0" encoding="utf-8"?>
-<p:sld xmlns:a="http://schemas.openxmlformats.org/drawingml/2006/main" xmlns:r="http://schemas.openxmlformats.org/officeDocument/2006/relationships" xmlns:p="http://schemas.openxmlformats.org/presentationml/2006/main">
+<p:sld xmlns:a="http://schemas.openxmlformats.org/drawingml/2006/main" xmlns:r="http://schemas.openxmlformats.org/officeDocument/2006/relationships" xmlns:p="http://schemas.openxmlformats.org/presentationml/2006/main" show="0">
   <p:cSld>
     <p:spTree>
       <p:nvGrpSpPr>
@@ -23872,7 +23595,7 @@
 </file>
 
 <file path=ppt/slides/slide29.xml><?xml version="1.0" encoding="utf-8"?>
-<p:sld xmlns:a="http://schemas.openxmlformats.org/drawingml/2006/main" xmlns:r="http://schemas.openxmlformats.org/officeDocument/2006/relationships" xmlns:p="http://schemas.openxmlformats.org/presentationml/2006/main">
+<p:sld xmlns:a="http://schemas.openxmlformats.org/drawingml/2006/main" xmlns:r="http://schemas.openxmlformats.org/officeDocument/2006/relationships" xmlns:p="http://schemas.openxmlformats.org/presentationml/2006/main" show="0">
   <p:cSld>
     <p:spTree>
       <p:nvGrpSpPr>
@@ -24110,7 +23833,7 @@
 </file>
 
 <file path=ppt/slides/slide30.xml><?xml version="1.0" encoding="utf-8"?>
-<p:sld xmlns:a="http://schemas.openxmlformats.org/drawingml/2006/main" xmlns:r="http://schemas.openxmlformats.org/officeDocument/2006/relationships" xmlns:p="http://schemas.openxmlformats.org/presentationml/2006/main">
+<p:sld xmlns:a="http://schemas.openxmlformats.org/drawingml/2006/main" xmlns:r="http://schemas.openxmlformats.org/officeDocument/2006/relationships" xmlns:p="http://schemas.openxmlformats.org/presentationml/2006/main" show="0">
   <p:cSld>
     <p:spTree>
       <p:nvGrpSpPr>
@@ -24251,7 +23974,7 @@
 </file>
 
 <file path=ppt/slides/slide31.xml><?xml version="1.0" encoding="utf-8"?>
-<p:sld xmlns:a="http://schemas.openxmlformats.org/drawingml/2006/main" xmlns:r="http://schemas.openxmlformats.org/officeDocument/2006/relationships" xmlns:p="http://schemas.openxmlformats.org/presentationml/2006/main">
+<p:sld xmlns:a="http://schemas.openxmlformats.org/drawingml/2006/main" xmlns:r="http://schemas.openxmlformats.org/officeDocument/2006/relationships" xmlns:p="http://schemas.openxmlformats.org/presentationml/2006/main" show="0">
   <p:cSld>
     <p:spTree>
       <p:nvGrpSpPr>
@@ -24411,7 +24134,7 @@
 </file>
 
 <file path=ppt/slides/slide32.xml><?xml version="1.0" encoding="utf-8"?>
-<p:sld xmlns:a="http://schemas.openxmlformats.org/drawingml/2006/main" xmlns:r="http://schemas.openxmlformats.org/officeDocument/2006/relationships" xmlns:p="http://schemas.openxmlformats.org/presentationml/2006/main">
+<p:sld xmlns:a="http://schemas.openxmlformats.org/drawingml/2006/main" xmlns:r="http://schemas.openxmlformats.org/officeDocument/2006/relationships" xmlns:p="http://schemas.openxmlformats.org/presentationml/2006/main" show="0">
   <p:cSld>
     <p:spTree>
       <p:nvGrpSpPr>
@@ -25849,7 +25572,7 @@
           <p:nvPr/>
         </p:nvPicPr>
         <p:blipFill rotWithShape="1">
-          <a:blip r:embed="rId2">
+          <a:blip r:embed="rId3">
             <a:extLst>
               <a:ext uri="{28A0092B-C50C-407E-A947-70E740481C1C}">
                 <a14:useLocalDpi xmlns:a14="http://schemas.microsoft.com/office/drawing/2010/main" val="0"/>
@@ -26437,7 +26160,7 @@
             <p:ph idx="1"/>
             <p:extLst>
               <p:ext uri="{D42A27DB-BD31-4B8C-83A1-F6EECF244321}">
-                <p14:modId xmlns:p14="http://schemas.microsoft.com/office/powerpoint/2010/main" val="584684978"/>
+                <p14:modId xmlns:p14="http://schemas.microsoft.com/office/powerpoint/2010/main" val="3301386751"/>
               </p:ext>
             </p:extLst>
           </p:nvPr>

</xml_diff>

<commit_message>
some notes in vuln_classes.pptx
</commit_message>
<xml_diff>
--- a/modules/vuln_classes/vuln_classes.pptx
+++ b/modules/vuln_classes/vuln_classes.pptx
@@ -5628,7 +5628,7 @@
   <dgm:whole/>
   <dgm:extLst>
     <a:ext uri="http://schemas.microsoft.com/office/drawing/2008/diagram">
-      <dsp:dataModelExt xmlns:dsp="http://schemas.microsoft.com/office/drawing/2008/diagram" relId="rId6" minVer="http://schemas.openxmlformats.org/drawingml/2006/diagram"/>
+      <dsp:dataModelExt xmlns:dsp="http://schemas.microsoft.com/office/drawing/2008/diagram" relId="rId7" minVer="http://schemas.openxmlformats.org/drawingml/2006/diagram"/>
     </a:ext>
   </dgm:extLst>
 </dgm:dataModel>
@@ -5729,7 +5729,7 @@
         <a:p>
           <a:r>
             <a:rPr lang="en-US" dirty="0" err="1"/>
-            <a:t>intro_to_malloc</a:t>
+            <a:t>vuln_classes</a:t>
           </a:r>
           <a:r>
             <a:rPr lang="en-US" dirty="0"/>
@@ -7798,8 +7798,8 @@
       </dsp:nvSpPr>
       <dsp:spPr>
         <a:xfrm>
-          <a:off x="38" y="692112"/>
-          <a:ext cx="3685337" cy="460800"/>
+          <a:off x="38" y="571851"/>
+          <a:ext cx="3685337" cy="612666"/>
         </a:xfrm>
         <a:prstGeom prst="rect">
           <a:avLst/>
@@ -7841,12 +7841,12 @@
         </a:fontRef>
       </dsp:style>
       <dsp:txBody>
-        <a:bodyPr spcFirstLastPara="0" vert="horz" wrap="square" lIns="113792" tIns="65024" rIns="113792" bIns="65024" numCol="1" spcCol="1270" anchor="ctr" anchorCtr="0">
+        <a:bodyPr spcFirstLastPara="0" vert="horz" wrap="square" lIns="120904" tIns="69088" rIns="120904" bIns="69088" numCol="1" spcCol="1270" anchor="ctr" anchorCtr="0">
           <a:noAutofit/>
         </a:bodyPr>
         <a:lstStyle/>
         <a:p>
-          <a:pPr marL="0" lvl="0" indent="0" algn="ctr" defTabSz="711200">
+          <a:pPr marL="0" lvl="0" indent="0" algn="ctr" defTabSz="755650">
             <a:lnSpc>
               <a:spcPct val="90000"/>
             </a:lnSpc>
@@ -7859,14 +7859,14 @@
             <a:buNone/>
           </a:pPr>
           <a:r>
-            <a:rPr lang="en-US" sz="1600" kern="1200" dirty="0"/>
+            <a:rPr lang="en-US" sz="1700" kern="1200" dirty="0"/>
             <a:t>Will not have challenges on these directly</a:t>
           </a:r>
         </a:p>
       </dsp:txBody>
       <dsp:txXfrm>
-        <a:off x="38" y="692112"/>
-        <a:ext cx="3685337" cy="460800"/>
+        <a:off x="38" y="571851"/>
+        <a:ext cx="3685337" cy="612666"/>
       </dsp:txXfrm>
     </dsp:sp>
     <dsp:sp modelId="{D32A4789-5DC8-464D-81D4-1C9B94C49C06}">
@@ -7876,8 +7876,8 @@
       </dsp:nvSpPr>
       <dsp:spPr>
         <a:xfrm>
-          <a:off x="38" y="1152912"/>
-          <a:ext cx="3685337" cy="1418478"/>
+          <a:off x="38" y="1184518"/>
+          <a:ext cx="3685337" cy="1507133"/>
         </a:xfrm>
         <a:prstGeom prst="rect">
           <a:avLst/>
@@ -7921,12 +7921,12 @@
         <a:fontRef idx="minor"/>
       </dsp:style>
       <dsp:txBody>
-        <a:bodyPr spcFirstLastPara="0" vert="horz" wrap="square" lIns="85344" tIns="85344" rIns="113792" bIns="128016" numCol="1" spcCol="1270" anchor="t" anchorCtr="0">
+        <a:bodyPr spcFirstLastPara="0" vert="horz" wrap="square" lIns="90678" tIns="90678" rIns="120904" bIns="136017" numCol="1" spcCol="1270" anchor="t" anchorCtr="0">
           <a:noAutofit/>
         </a:bodyPr>
         <a:lstStyle/>
         <a:p>
-          <a:pPr marL="171450" lvl="1" indent="-171450" algn="l" defTabSz="711200">
+          <a:pPr marL="171450" lvl="1" indent="-171450" algn="l" defTabSz="755650">
             <a:lnSpc>
               <a:spcPct val="90000"/>
             </a:lnSpc>
@@ -7939,12 +7939,12 @@
             <a:buChar char="•"/>
           </a:pPr>
           <a:r>
-            <a:rPr lang="en-US" sz="1600" kern="1200" dirty="0"/>
+            <a:rPr lang="en-US" sz="1700" kern="1200" dirty="0"/>
             <a:t>Bug class protection as opposed to a technique</a:t>
           </a:r>
         </a:p>
         <a:p>
-          <a:pPr marL="171450" lvl="1" indent="-171450" algn="l" defTabSz="711200">
+          <a:pPr marL="171450" lvl="1" indent="-171450" algn="l" defTabSz="755650">
             <a:lnSpc>
               <a:spcPct val="90000"/>
             </a:lnSpc>
@@ -7957,14 +7957,14 @@
             <a:buChar char="•"/>
           </a:pPr>
           <a:r>
-            <a:rPr lang="en-US" sz="1600" kern="1200" dirty="0"/>
+            <a:rPr lang="en-US" sz="1700" kern="1200" dirty="0"/>
             <a:t>Will sprinkle in bypasses for double free when it feels appropriate though</a:t>
           </a:r>
         </a:p>
       </dsp:txBody>
       <dsp:txXfrm>
-        <a:off x="38" y="1152912"/>
-        <a:ext cx="3685337" cy="1418478"/>
+        <a:off x="38" y="1184518"/>
+        <a:ext cx="3685337" cy="1507133"/>
       </dsp:txXfrm>
     </dsp:sp>
     <dsp:sp modelId="{43A045CE-2C43-8A46-B201-0329A58067A3}">
@@ -7974,8 +7974,8 @@
       </dsp:nvSpPr>
       <dsp:spPr>
         <a:xfrm>
-          <a:off x="4201323" y="692112"/>
-          <a:ext cx="3685337" cy="460800"/>
+          <a:off x="4201323" y="571851"/>
+          <a:ext cx="3685337" cy="612666"/>
         </a:xfrm>
         <a:prstGeom prst="rect">
           <a:avLst/>
@@ -8017,12 +8017,12 @@
         </a:fontRef>
       </dsp:style>
       <dsp:txBody>
-        <a:bodyPr spcFirstLastPara="0" vert="horz" wrap="square" lIns="113792" tIns="65024" rIns="113792" bIns="65024" numCol="1" spcCol="1270" anchor="ctr" anchorCtr="0">
+        <a:bodyPr spcFirstLastPara="0" vert="horz" wrap="square" lIns="120904" tIns="69088" rIns="120904" bIns="69088" numCol="1" spcCol="1270" anchor="ctr" anchorCtr="0">
           <a:noAutofit/>
         </a:bodyPr>
         <a:lstStyle/>
         <a:p>
-          <a:pPr marL="0" lvl="0" indent="0" algn="ctr" defTabSz="711200">
+          <a:pPr marL="0" lvl="0" indent="0" algn="ctr" defTabSz="755650">
             <a:lnSpc>
               <a:spcPct val="90000"/>
             </a:lnSpc>
@@ -8035,26 +8035,26 @@
             <a:buNone/>
           </a:pPr>
           <a:r>
-            <a:rPr lang="en-US" sz="1600" kern="1200" dirty="0" err="1"/>
-            <a:t>intro_to_malloc</a:t>
+            <a:rPr lang="en-US" sz="1700" kern="1200" dirty="0" err="1"/>
+            <a:t>vuln_classes</a:t>
           </a:r>
           <a:r>
-            <a:rPr lang="en-US" sz="1600" kern="1200" dirty="0"/>
+            <a:rPr lang="en-US" sz="1700" kern="1200" dirty="0"/>
             <a:t>/</a:t>
           </a:r>
           <a:r>
-            <a:rPr lang="en-US" sz="1600" kern="1200" dirty="0" err="1"/>
+            <a:rPr lang="en-US" sz="1700" kern="1200" dirty="0" err="1"/>
             <a:t>double_free_playground</a:t>
           </a:r>
           <a:r>
-            <a:rPr lang="en-US" sz="1600" kern="1200" dirty="0"/>
+            <a:rPr lang="en-US" sz="1700" kern="1200" dirty="0"/>
             <a:t> </a:t>
           </a:r>
         </a:p>
       </dsp:txBody>
       <dsp:txXfrm>
-        <a:off x="4201323" y="692112"/>
-        <a:ext cx="3685337" cy="460800"/>
+        <a:off x="4201323" y="571851"/>
+        <a:ext cx="3685337" cy="612666"/>
       </dsp:txXfrm>
     </dsp:sp>
     <dsp:sp modelId="{62A51FD6-0B17-0749-B941-F2DDBEE84721}">
@@ -8064,8 +8064,8 @@
       </dsp:nvSpPr>
       <dsp:spPr>
         <a:xfrm>
-          <a:off x="4201323" y="1152912"/>
-          <a:ext cx="3685337" cy="1418478"/>
+          <a:off x="4201323" y="1184518"/>
+          <a:ext cx="3685337" cy="1507133"/>
         </a:xfrm>
         <a:prstGeom prst="rect">
           <a:avLst/>
@@ -8109,12 +8109,12 @@
         <a:fontRef idx="minor"/>
       </dsp:style>
       <dsp:txBody>
-        <a:bodyPr spcFirstLastPara="0" vert="horz" wrap="square" lIns="85344" tIns="85344" rIns="113792" bIns="128016" numCol="1" spcCol="1270" anchor="t" anchorCtr="0">
+        <a:bodyPr spcFirstLastPara="0" vert="horz" wrap="square" lIns="90678" tIns="90678" rIns="120904" bIns="136017" numCol="1" spcCol="1270" anchor="t" anchorCtr="0">
           <a:noAutofit/>
         </a:bodyPr>
         <a:lstStyle/>
         <a:p>
-          <a:pPr marL="171450" lvl="1" indent="-171450" algn="l" defTabSz="711200">
+          <a:pPr marL="171450" lvl="1" indent="-171450" algn="l" defTabSz="755650">
             <a:lnSpc>
               <a:spcPct val="90000"/>
             </a:lnSpc>
@@ -8127,12 +8127,12 @@
             <a:buChar char="•"/>
           </a:pPr>
           <a:r>
-            <a:rPr lang="en-US" sz="1600" kern="1200" dirty="0"/>
+            <a:rPr lang="en-US" sz="1700" kern="1200" dirty="0"/>
             <a:t>An assortment of double free bypass attempts</a:t>
           </a:r>
         </a:p>
         <a:p>
-          <a:pPr marL="171450" lvl="1" indent="-171450" algn="l" defTabSz="711200">
+          <a:pPr marL="171450" lvl="1" indent="-171450" algn="l" defTabSz="755650">
             <a:lnSpc>
               <a:spcPct val="90000"/>
             </a:lnSpc>
@@ -8145,16 +8145,16 @@
             <a:buChar char="•"/>
           </a:pPr>
           <a:r>
-            <a:rPr lang="en-US" sz="1600" kern="1200" dirty="0" err="1"/>
+            <a:rPr lang="en-US" sz="1700" kern="1200" dirty="0" err="1"/>
             <a:t>setup.py</a:t>
           </a:r>
           <a:r>
-            <a:rPr lang="en-US" sz="1600" kern="1200" dirty="0"/>
+            <a:rPr lang="en-US" sz="1700" kern="1200" dirty="0"/>
             <a:t> 0|1|2|3|4|5 for different challenges</a:t>
           </a:r>
         </a:p>
         <a:p>
-          <a:pPr marL="171450" lvl="1" indent="-171450" algn="l" defTabSz="711200">
+          <a:pPr marL="171450" lvl="1" indent="-171450" algn="l" defTabSz="755650">
             <a:lnSpc>
               <a:spcPct val="90000"/>
             </a:lnSpc>
@@ -8167,34 +8167,34 @@
             <a:buChar char="•"/>
           </a:pPr>
           <a:r>
-            <a:rPr lang="en-US" sz="1600" kern="1200" dirty="0" err="1"/>
+            <a:rPr lang="en-US" sz="1700" kern="1200" dirty="0" err="1"/>
             <a:t>Fastbin</a:t>
           </a:r>
           <a:r>
-            <a:rPr lang="en-US" sz="1600" kern="1200" dirty="0"/>
+            <a:rPr lang="en-US" sz="1700" kern="1200" dirty="0"/>
             <a:t> </a:t>
           </a:r>
           <a:r>
-            <a:rPr lang="en-US" sz="1600" kern="1200" dirty="0" err="1"/>
+            <a:rPr lang="en-US" sz="1700" kern="1200" dirty="0" err="1"/>
             <a:t>dupping</a:t>
           </a:r>
           <a:r>
-            <a:rPr lang="en-US" sz="1600" kern="1200" dirty="0"/>
+            <a:rPr lang="en-US" sz="1700" kern="1200" dirty="0"/>
             <a:t>, </a:t>
           </a:r>
           <a:r>
-            <a:rPr lang="en-US" sz="1600" kern="1200" dirty="0" err="1"/>
+            <a:rPr lang="en-US" sz="1700" kern="1200" dirty="0" err="1"/>
             <a:t>botcake</a:t>
           </a:r>
           <a:r>
-            <a:rPr lang="en-US" sz="1600" kern="1200" dirty="0"/>
+            <a:rPr lang="en-US" sz="1700" kern="1200" dirty="0"/>
             <a:t>…</a:t>
           </a:r>
         </a:p>
       </dsp:txBody>
       <dsp:txXfrm>
-        <a:off x="4201323" y="1152912"/>
-        <a:ext cx="3685337" cy="1418478"/>
+        <a:off x="4201323" y="1184518"/>
+        <a:ext cx="3685337" cy="1507133"/>
       </dsp:txXfrm>
     </dsp:sp>
   </dsp:spTree>
@@ -16023,7 +16023,7 @@
           <a:p>
             <a:fld id="{2DA23E8D-1792-1541-9147-970A8DD8A355}" type="datetimeFigureOut">
               <a:rPr lang="en-US" smtClean="0"/>
-              <a:t>11/14/21</a:t>
+              <a:t>3/8/22</a:t>
             </a:fld>
             <a:endParaRPr lang="en-US" dirty="0"/>
           </a:p>
@@ -16397,6 +16397,291 @@
 </p:notes>
 </file>
 
+<file path=ppt/notesSlides/notesSlide10.xml><?xml version="1.0" encoding="utf-8"?>
+<p:notes xmlns:a="http://schemas.openxmlformats.org/drawingml/2006/main" xmlns:r="http://schemas.openxmlformats.org/officeDocument/2006/relationships" xmlns:p="http://schemas.openxmlformats.org/presentationml/2006/main">
+  <p:cSld>
+    <p:spTree>
+      <p:nvGrpSpPr>
+        <p:cNvPr id="1" name=""/>
+        <p:cNvGrpSpPr/>
+        <p:nvPr/>
+      </p:nvGrpSpPr>
+      <p:grpSpPr>
+        <a:xfrm>
+          <a:off x="0" y="0"/>
+          <a:ext cx="0" cy="0"/>
+          <a:chOff x="0" y="0"/>
+          <a:chExt cx="0" cy="0"/>
+        </a:xfrm>
+      </p:grpSpPr>
+      <p:sp>
+        <p:nvSpPr>
+          <p:cNvPr id="2" name="Slide Image Placeholder 1"/>
+          <p:cNvSpPr>
+            <a:spLocks noGrp="1" noRot="1" noChangeAspect="1"/>
+          </p:cNvSpPr>
+          <p:nvPr>
+            <p:ph type="sldImg"/>
+          </p:nvPr>
+        </p:nvSpPr>
+        <p:spPr/>
+      </p:sp>
+      <p:sp>
+        <p:nvSpPr>
+          <p:cNvPr id="3" name="Notes Placeholder 2"/>
+          <p:cNvSpPr>
+            <a:spLocks noGrp="1"/>
+          </p:cNvSpPr>
+          <p:nvPr>
+            <p:ph type="body" idx="1"/>
+          </p:nvPr>
+        </p:nvSpPr>
+        <p:spPr/>
+        <p:txBody>
+          <a:bodyPr/>
+          <a:lstStyle/>
+          <a:p>
+            <a:r>
+              <a:rPr lang="en-US" dirty="0"/>
+              <a:t>House of </a:t>
+            </a:r>
+            <a:r>
+              <a:rPr lang="en-US" dirty="0" err="1"/>
+              <a:t>Botcake</a:t>
+            </a:r>
+            <a:r>
+              <a:rPr lang="en-US" dirty="0"/>
+              <a:t>: it exists, we’re </a:t>
+            </a:r>
+            <a:r>
+              <a:rPr lang="en-US" dirty="0" err="1"/>
+              <a:t>gonna</a:t>
+            </a:r>
+            <a:r>
+              <a:rPr lang="en-US" dirty="0"/>
+              <a:t> not cover it</a:t>
+            </a:r>
+          </a:p>
+        </p:txBody>
+      </p:sp>
+      <p:sp>
+        <p:nvSpPr>
+          <p:cNvPr id="4" name="Slide Number Placeholder 3"/>
+          <p:cNvSpPr>
+            <a:spLocks noGrp="1"/>
+          </p:cNvSpPr>
+          <p:nvPr>
+            <p:ph type="sldNum" sz="quarter" idx="5"/>
+          </p:nvPr>
+        </p:nvSpPr>
+        <p:spPr/>
+        <p:txBody>
+          <a:bodyPr/>
+          <a:lstStyle/>
+          <a:p>
+            <a:fld id="{AC55928C-CD14-454C-B617-1AFCF9A58596}" type="slidenum">
+              <a:rPr lang="en-US" smtClean="0"/>
+              <a:t>37</a:t>
+            </a:fld>
+            <a:endParaRPr lang="en-US" dirty="0"/>
+          </a:p>
+        </p:txBody>
+      </p:sp>
+    </p:spTree>
+    <p:extLst>
+      <p:ext uri="{BB962C8B-B14F-4D97-AF65-F5344CB8AC3E}">
+        <p14:creationId xmlns:p14="http://schemas.microsoft.com/office/powerpoint/2010/main" val="2232360295"/>
+      </p:ext>
+    </p:extLst>
+  </p:cSld>
+  <p:clrMapOvr>
+    <a:masterClrMapping/>
+  </p:clrMapOvr>
+</p:notes>
+</file>
+
+<file path=ppt/notesSlides/notesSlide11.xml><?xml version="1.0" encoding="utf-8"?>
+<p:notes xmlns:a="http://schemas.openxmlformats.org/drawingml/2006/main" xmlns:r="http://schemas.openxmlformats.org/officeDocument/2006/relationships" xmlns:p="http://schemas.openxmlformats.org/presentationml/2006/main">
+  <p:cSld>
+    <p:spTree>
+      <p:nvGrpSpPr>
+        <p:cNvPr id="1" name=""/>
+        <p:cNvGrpSpPr/>
+        <p:nvPr/>
+      </p:nvGrpSpPr>
+      <p:grpSpPr>
+        <a:xfrm>
+          <a:off x="0" y="0"/>
+          <a:ext cx="0" cy="0"/>
+          <a:chOff x="0" y="0"/>
+          <a:chExt cx="0" cy="0"/>
+        </a:xfrm>
+      </p:grpSpPr>
+      <p:sp>
+        <p:nvSpPr>
+          <p:cNvPr id="2" name="Slide Image Placeholder 1"/>
+          <p:cNvSpPr>
+            <a:spLocks noGrp="1" noRot="1" noChangeAspect="1"/>
+          </p:cNvSpPr>
+          <p:nvPr>
+            <p:ph type="sldImg"/>
+          </p:nvPr>
+        </p:nvSpPr>
+        <p:spPr/>
+      </p:sp>
+      <p:sp>
+        <p:nvSpPr>
+          <p:cNvPr id="3" name="Notes Placeholder 2"/>
+          <p:cNvSpPr>
+            <a:spLocks noGrp="1"/>
+          </p:cNvSpPr>
+          <p:nvPr>
+            <p:ph type="body" idx="1"/>
+          </p:nvPr>
+        </p:nvSpPr>
+        <p:spPr/>
+        <p:txBody>
+          <a:bodyPr/>
+          <a:lstStyle/>
+          <a:p>
+            <a:r>
+              <a:rPr lang="en-US" dirty="0"/>
+              <a:t>We’re </a:t>
+            </a:r>
+            <a:r>
+              <a:rPr lang="en-US" dirty="0" err="1"/>
+              <a:t>gonna</a:t>
+            </a:r>
+            <a:r>
+              <a:rPr lang="en-US" dirty="0"/>
+              <a:t> cover this again</a:t>
+            </a:r>
+          </a:p>
+        </p:txBody>
+      </p:sp>
+      <p:sp>
+        <p:nvSpPr>
+          <p:cNvPr id="4" name="Slide Number Placeholder 3"/>
+          <p:cNvSpPr>
+            <a:spLocks noGrp="1"/>
+          </p:cNvSpPr>
+          <p:nvPr>
+            <p:ph type="sldNum" sz="quarter" idx="5"/>
+          </p:nvPr>
+        </p:nvSpPr>
+        <p:spPr/>
+        <p:txBody>
+          <a:bodyPr/>
+          <a:lstStyle/>
+          <a:p>
+            <a:fld id="{AC55928C-CD14-454C-B617-1AFCF9A58596}" type="slidenum">
+              <a:rPr lang="en-US" smtClean="0"/>
+              <a:t>42</a:t>
+            </a:fld>
+            <a:endParaRPr lang="en-US" dirty="0"/>
+          </a:p>
+        </p:txBody>
+      </p:sp>
+    </p:spTree>
+    <p:extLst>
+      <p:ext uri="{BB962C8B-B14F-4D97-AF65-F5344CB8AC3E}">
+        <p14:creationId xmlns:p14="http://schemas.microsoft.com/office/powerpoint/2010/main" val="3654713969"/>
+      </p:ext>
+    </p:extLst>
+  </p:cSld>
+  <p:clrMapOvr>
+    <a:masterClrMapping/>
+  </p:clrMapOvr>
+</p:notes>
+</file>
+
+<file path=ppt/notesSlides/notesSlide12.xml><?xml version="1.0" encoding="utf-8"?>
+<p:notes xmlns:a="http://schemas.openxmlformats.org/drawingml/2006/main" xmlns:r="http://schemas.openxmlformats.org/officeDocument/2006/relationships" xmlns:p="http://schemas.openxmlformats.org/presentationml/2006/main">
+  <p:cSld>
+    <p:spTree>
+      <p:nvGrpSpPr>
+        <p:cNvPr id="1" name=""/>
+        <p:cNvGrpSpPr/>
+        <p:nvPr/>
+      </p:nvGrpSpPr>
+      <p:grpSpPr>
+        <a:xfrm>
+          <a:off x="0" y="0"/>
+          <a:ext cx="0" cy="0"/>
+          <a:chOff x="0" y="0"/>
+          <a:chExt cx="0" cy="0"/>
+        </a:xfrm>
+      </p:grpSpPr>
+      <p:sp>
+        <p:nvSpPr>
+          <p:cNvPr id="2" name="Slide Image Placeholder 1"/>
+          <p:cNvSpPr>
+            <a:spLocks noGrp="1" noRot="1" noChangeAspect="1"/>
+          </p:cNvSpPr>
+          <p:nvPr>
+            <p:ph type="sldImg"/>
+          </p:nvPr>
+        </p:nvSpPr>
+        <p:spPr/>
+      </p:sp>
+      <p:sp>
+        <p:nvSpPr>
+          <p:cNvPr id="3" name="Notes Placeholder 2"/>
+          <p:cNvSpPr>
+            <a:spLocks noGrp="1"/>
+          </p:cNvSpPr>
+          <p:nvPr>
+            <p:ph type="body" idx="1"/>
+          </p:nvPr>
+        </p:nvSpPr>
+        <p:spPr/>
+        <p:txBody>
+          <a:bodyPr/>
+          <a:lstStyle/>
+          <a:p>
+            <a:r>
+              <a:rPr lang="en-US" dirty="0"/>
+              <a:t>This is the same thing again</a:t>
+            </a:r>
+          </a:p>
+        </p:txBody>
+      </p:sp>
+      <p:sp>
+        <p:nvSpPr>
+          <p:cNvPr id="4" name="Slide Number Placeholder 3"/>
+          <p:cNvSpPr>
+            <a:spLocks noGrp="1"/>
+          </p:cNvSpPr>
+          <p:nvPr>
+            <p:ph type="sldNum" sz="quarter" idx="5"/>
+          </p:nvPr>
+        </p:nvSpPr>
+        <p:spPr/>
+        <p:txBody>
+          <a:bodyPr/>
+          <a:lstStyle/>
+          <a:p>
+            <a:fld id="{AC55928C-CD14-454C-B617-1AFCF9A58596}" type="slidenum">
+              <a:rPr lang="en-US" smtClean="0"/>
+              <a:t>43</a:t>
+            </a:fld>
+            <a:endParaRPr lang="en-US" dirty="0"/>
+          </a:p>
+        </p:txBody>
+      </p:sp>
+    </p:spTree>
+    <p:extLst>
+      <p:ext uri="{BB962C8B-B14F-4D97-AF65-F5344CB8AC3E}">
+        <p14:creationId xmlns:p14="http://schemas.microsoft.com/office/powerpoint/2010/main" val="2315643534"/>
+      </p:ext>
+    </p:extLst>
+  </p:cSld>
+  <p:clrMapOvr>
+    <a:masterClrMapping/>
+  </p:clrMapOvr>
+</p:notes>
+</file>
+
 <file path=ppt/notesSlides/notesSlide2.xml><?xml version="1.0" encoding="utf-8"?>
 <p:notes xmlns:a="http://schemas.openxmlformats.org/drawingml/2006/main" xmlns:r="http://schemas.openxmlformats.org/officeDocument/2006/relationships" xmlns:p="http://schemas.openxmlformats.org/presentationml/2006/main">
   <p:cSld>
@@ -16444,6 +16729,15 @@
             <a:r>
               <a:rPr lang="en-US" dirty="0"/>
               <a:t>Questions?</a:t>
+            </a:r>
+          </a:p>
+          <a:p>
+            <a:endParaRPr lang="en-US" dirty="0"/>
+          </a:p>
+          <a:p>
+            <a:r>
+              <a:rPr lang="en-US" dirty="0"/>
+              <a:t>This is one way to exploit this is to get the memory to be reallocated, then we can view or edit it, or another way to exploit this is to…</a:t>
             </a:r>
           </a:p>
         </p:txBody>
@@ -16530,7 +16824,7 @@
           <a:p>
             <a:r>
               <a:rPr lang="en-US" dirty="0"/>
-              <a:t>Questions?</a:t>
+              <a:t>…is to manipulate memory structures in the allocator.</a:t>
             </a:r>
           </a:p>
         </p:txBody>
@@ -16552,7 +16846,7 @@
           <a:p>
             <a:fld id="{AC55928C-CD14-454C-B617-1AFCF9A58596}" type="slidenum">
               <a:rPr lang="en-US" smtClean="0"/>
-              <a:t>19</a:t>
+              <a:t>6</a:t>
             </a:fld>
             <a:endParaRPr lang="en-US" dirty="0"/>
           </a:p>
@@ -16561,7 +16855,7 @@
     </p:spTree>
     <p:extLst>
       <p:ext uri="{BB962C8B-B14F-4D97-AF65-F5344CB8AC3E}">
-        <p14:creationId xmlns:p14="http://schemas.microsoft.com/office/powerpoint/2010/main" val="2404414752"/>
+        <p14:creationId xmlns:p14="http://schemas.microsoft.com/office/powerpoint/2010/main" val="1911693688"/>
       </p:ext>
     </p:extLst>
   </p:cSld>
@@ -16615,6 +16909,276 @@
           <a:bodyPr/>
           <a:lstStyle/>
           <a:p>
+            <a:r>
+              <a:rPr lang="en-US" dirty="0"/>
+              <a:t>!After this there are slides!</a:t>
+            </a:r>
+          </a:p>
+          <a:p>
+            <a:endParaRPr lang="en-US" dirty="0"/>
+          </a:p>
+          <a:p>
+            <a:r>
+              <a:rPr lang="en-US" dirty="0"/>
+              <a:t>!Go through how to use it!</a:t>
+            </a:r>
+          </a:p>
+        </p:txBody>
+      </p:sp>
+      <p:sp>
+        <p:nvSpPr>
+          <p:cNvPr id="4" name="Slide Number Placeholder 3"/>
+          <p:cNvSpPr>
+            <a:spLocks noGrp="1"/>
+          </p:cNvSpPr>
+          <p:nvPr>
+            <p:ph type="sldNum" sz="quarter" idx="5"/>
+          </p:nvPr>
+        </p:nvSpPr>
+        <p:spPr/>
+        <p:txBody>
+          <a:bodyPr/>
+          <a:lstStyle/>
+          <a:p>
+            <a:fld id="{AC55928C-CD14-454C-B617-1AFCF9A58596}" type="slidenum">
+              <a:rPr lang="en-US" smtClean="0"/>
+              <a:t>7</a:t>
+            </a:fld>
+            <a:endParaRPr lang="en-US" dirty="0"/>
+          </a:p>
+        </p:txBody>
+      </p:sp>
+    </p:spTree>
+    <p:extLst>
+      <p:ext uri="{BB962C8B-B14F-4D97-AF65-F5344CB8AC3E}">
+        <p14:creationId xmlns:p14="http://schemas.microsoft.com/office/powerpoint/2010/main" val="3014907576"/>
+      </p:ext>
+    </p:extLst>
+  </p:cSld>
+  <p:clrMapOvr>
+    <a:masterClrMapping/>
+  </p:clrMapOvr>
+</p:notes>
+</file>
+
+<file path=ppt/notesSlides/notesSlide5.xml><?xml version="1.0" encoding="utf-8"?>
+<p:notes xmlns:a="http://schemas.openxmlformats.org/drawingml/2006/main" xmlns:r="http://schemas.openxmlformats.org/officeDocument/2006/relationships" xmlns:p="http://schemas.openxmlformats.org/presentationml/2006/main">
+  <p:cSld>
+    <p:spTree>
+      <p:nvGrpSpPr>
+        <p:cNvPr id="1" name=""/>
+        <p:cNvGrpSpPr/>
+        <p:nvPr/>
+      </p:nvGrpSpPr>
+      <p:grpSpPr>
+        <a:xfrm>
+          <a:off x="0" y="0"/>
+          <a:ext cx="0" cy="0"/>
+          <a:chOff x="0" y="0"/>
+          <a:chExt cx="0" cy="0"/>
+        </a:xfrm>
+      </p:grpSpPr>
+      <p:sp>
+        <p:nvSpPr>
+          <p:cNvPr id="2" name="Slide Image Placeholder 1"/>
+          <p:cNvSpPr>
+            <a:spLocks noGrp="1" noRot="1" noChangeAspect="1"/>
+          </p:cNvSpPr>
+          <p:nvPr>
+            <p:ph type="sldImg"/>
+          </p:nvPr>
+        </p:nvSpPr>
+        <p:spPr/>
+      </p:sp>
+      <p:sp>
+        <p:nvSpPr>
+          <p:cNvPr id="3" name="Notes Placeholder 2"/>
+          <p:cNvSpPr>
+            <a:spLocks noGrp="1"/>
+          </p:cNvSpPr>
+          <p:nvPr>
+            <p:ph type="body" idx="1"/>
+          </p:nvPr>
+        </p:nvSpPr>
+        <p:spPr/>
+        <p:txBody>
+          <a:bodyPr/>
+          <a:lstStyle/>
+          <a:p>
+            <a:r>
+              <a:rPr lang="en-US" dirty="0"/>
+              <a:t>We are using the same memory after freeing: we allocate the player struct, we free it, then we use it in “won”.  There’s out use after free.</a:t>
+            </a:r>
+          </a:p>
+        </p:txBody>
+      </p:sp>
+      <p:sp>
+        <p:nvSpPr>
+          <p:cNvPr id="4" name="Slide Number Placeholder 3"/>
+          <p:cNvSpPr>
+            <a:spLocks noGrp="1"/>
+          </p:cNvSpPr>
+          <p:nvPr>
+            <p:ph type="sldNum" sz="quarter" idx="5"/>
+          </p:nvPr>
+        </p:nvSpPr>
+        <p:spPr/>
+        <p:txBody>
+          <a:bodyPr/>
+          <a:lstStyle/>
+          <a:p>
+            <a:fld id="{AC55928C-CD14-454C-B617-1AFCF9A58596}" type="slidenum">
+              <a:rPr lang="en-US" smtClean="0"/>
+              <a:t>16</a:t>
+            </a:fld>
+            <a:endParaRPr lang="en-US" dirty="0"/>
+          </a:p>
+        </p:txBody>
+      </p:sp>
+    </p:spTree>
+    <p:extLst>
+      <p:ext uri="{BB962C8B-B14F-4D97-AF65-F5344CB8AC3E}">
+        <p14:creationId xmlns:p14="http://schemas.microsoft.com/office/powerpoint/2010/main" val="3737808289"/>
+      </p:ext>
+    </p:extLst>
+  </p:cSld>
+  <p:clrMapOvr>
+    <a:masterClrMapping/>
+  </p:clrMapOvr>
+</p:notes>
+</file>
+
+<file path=ppt/notesSlides/notesSlide6.xml><?xml version="1.0" encoding="utf-8"?>
+<p:notes xmlns:a="http://schemas.openxmlformats.org/drawingml/2006/main" xmlns:r="http://schemas.openxmlformats.org/officeDocument/2006/relationships" xmlns:p="http://schemas.openxmlformats.org/presentationml/2006/main">
+  <p:cSld>
+    <p:spTree>
+      <p:nvGrpSpPr>
+        <p:cNvPr id="1" name=""/>
+        <p:cNvGrpSpPr/>
+        <p:nvPr/>
+      </p:nvGrpSpPr>
+      <p:grpSpPr>
+        <a:xfrm>
+          <a:off x="0" y="0"/>
+          <a:ext cx="0" cy="0"/>
+          <a:chOff x="0" y="0"/>
+          <a:chExt cx="0" cy="0"/>
+        </a:xfrm>
+      </p:grpSpPr>
+      <p:sp>
+        <p:nvSpPr>
+          <p:cNvPr id="2" name="Slide Image Placeholder 1"/>
+          <p:cNvSpPr>
+            <a:spLocks noGrp="1" noRot="1" noChangeAspect="1"/>
+          </p:cNvSpPr>
+          <p:nvPr>
+            <p:ph type="sldImg"/>
+          </p:nvPr>
+        </p:nvSpPr>
+        <p:spPr/>
+      </p:sp>
+      <p:sp>
+        <p:nvSpPr>
+          <p:cNvPr id="3" name="Notes Placeholder 2"/>
+          <p:cNvSpPr>
+            <a:spLocks noGrp="1"/>
+          </p:cNvSpPr>
+          <p:nvPr>
+            <p:ph type="body" idx="1"/>
+          </p:nvPr>
+        </p:nvSpPr>
+        <p:spPr/>
+        <p:txBody>
+          <a:bodyPr/>
+          <a:lstStyle/>
+          <a:p>
+            <a:r>
+              <a:rPr lang="en-US" dirty="0"/>
+              <a:t>Questions?</a:t>
+            </a:r>
+          </a:p>
+        </p:txBody>
+      </p:sp>
+      <p:sp>
+        <p:nvSpPr>
+          <p:cNvPr id="4" name="Slide Number Placeholder 3"/>
+          <p:cNvSpPr>
+            <a:spLocks noGrp="1"/>
+          </p:cNvSpPr>
+          <p:nvPr>
+            <p:ph type="sldNum" sz="quarter" idx="5"/>
+          </p:nvPr>
+        </p:nvSpPr>
+        <p:spPr/>
+        <p:txBody>
+          <a:bodyPr/>
+          <a:lstStyle/>
+          <a:p>
+            <a:fld id="{AC55928C-CD14-454C-B617-1AFCF9A58596}" type="slidenum">
+              <a:rPr lang="en-US" smtClean="0"/>
+              <a:t>19</a:t>
+            </a:fld>
+            <a:endParaRPr lang="en-US" dirty="0"/>
+          </a:p>
+        </p:txBody>
+      </p:sp>
+    </p:spTree>
+    <p:extLst>
+      <p:ext uri="{BB962C8B-B14F-4D97-AF65-F5344CB8AC3E}">
+        <p14:creationId xmlns:p14="http://schemas.microsoft.com/office/powerpoint/2010/main" val="2404414752"/>
+      </p:ext>
+    </p:extLst>
+  </p:cSld>
+  <p:clrMapOvr>
+    <a:masterClrMapping/>
+  </p:clrMapOvr>
+</p:notes>
+</file>
+
+<file path=ppt/notesSlides/notesSlide7.xml><?xml version="1.0" encoding="utf-8"?>
+<p:notes xmlns:a="http://schemas.openxmlformats.org/drawingml/2006/main" xmlns:r="http://schemas.openxmlformats.org/officeDocument/2006/relationships" xmlns:p="http://schemas.openxmlformats.org/presentationml/2006/main">
+  <p:cSld>
+    <p:spTree>
+      <p:nvGrpSpPr>
+        <p:cNvPr id="1" name=""/>
+        <p:cNvGrpSpPr/>
+        <p:nvPr/>
+      </p:nvGrpSpPr>
+      <p:grpSpPr>
+        <a:xfrm>
+          <a:off x="0" y="0"/>
+          <a:ext cx="0" cy="0"/>
+          <a:chOff x="0" y="0"/>
+          <a:chExt cx="0" cy="0"/>
+        </a:xfrm>
+      </p:grpSpPr>
+      <p:sp>
+        <p:nvSpPr>
+          <p:cNvPr id="2" name="Slide Image Placeholder 1"/>
+          <p:cNvSpPr>
+            <a:spLocks noGrp="1" noRot="1" noChangeAspect="1"/>
+          </p:cNvSpPr>
+          <p:nvPr>
+            <p:ph type="sldImg"/>
+          </p:nvPr>
+        </p:nvSpPr>
+        <p:spPr/>
+      </p:sp>
+      <p:sp>
+        <p:nvSpPr>
+          <p:cNvPr id="3" name="Notes Placeholder 2"/>
+          <p:cNvSpPr>
+            <a:spLocks noGrp="1"/>
+          </p:cNvSpPr>
+          <p:nvPr>
+            <p:ph type="body" idx="1"/>
+          </p:nvPr>
+        </p:nvSpPr>
+        <p:spPr/>
+        <p:txBody>
+          <a:bodyPr/>
+          <a:lstStyle/>
+          <a:p>
             <a:pPr marL="0" marR="0" lvl="0" indent="0" algn="l" defTabSz="457200" rtl="0" eaLnBrk="1" fontAlgn="auto" latinLnBrk="0" hangingPunct="1">
               <a:lnSpc>
                 <a:spcPct val="100000"/>
@@ -16669,6 +17233,177 @@
     <p:extLst>
       <p:ext uri="{BB962C8B-B14F-4D97-AF65-F5344CB8AC3E}">
         <p14:creationId xmlns:p14="http://schemas.microsoft.com/office/powerpoint/2010/main" val="960306344"/>
+      </p:ext>
+    </p:extLst>
+  </p:cSld>
+  <p:clrMapOvr>
+    <a:masterClrMapping/>
+  </p:clrMapOvr>
+</p:notes>
+</file>
+
+<file path=ppt/notesSlides/notesSlide8.xml><?xml version="1.0" encoding="utf-8"?>
+<p:notes xmlns:a="http://schemas.openxmlformats.org/drawingml/2006/main" xmlns:r="http://schemas.openxmlformats.org/officeDocument/2006/relationships" xmlns:p="http://schemas.openxmlformats.org/presentationml/2006/main">
+  <p:cSld>
+    <p:spTree>
+      <p:nvGrpSpPr>
+        <p:cNvPr id="1" name=""/>
+        <p:cNvGrpSpPr/>
+        <p:nvPr/>
+      </p:nvGrpSpPr>
+      <p:grpSpPr>
+        <a:xfrm>
+          <a:off x="0" y="0"/>
+          <a:ext cx="0" cy="0"/>
+          <a:chOff x="0" y="0"/>
+          <a:chExt cx="0" cy="0"/>
+        </a:xfrm>
+      </p:grpSpPr>
+      <p:sp>
+        <p:nvSpPr>
+          <p:cNvPr id="2" name="Slide Image Placeholder 1"/>
+          <p:cNvSpPr>
+            <a:spLocks noGrp="1" noRot="1" noChangeAspect="1"/>
+          </p:cNvSpPr>
+          <p:nvPr>
+            <p:ph type="sldImg"/>
+          </p:nvPr>
+        </p:nvSpPr>
+        <p:spPr/>
+      </p:sp>
+      <p:sp>
+        <p:nvSpPr>
+          <p:cNvPr id="3" name="Notes Placeholder 2"/>
+          <p:cNvSpPr>
+            <a:spLocks noGrp="1"/>
+          </p:cNvSpPr>
+          <p:nvPr>
+            <p:ph type="body" idx="1"/>
+          </p:nvPr>
+        </p:nvSpPr>
+        <p:spPr/>
+        <p:txBody>
+          <a:bodyPr/>
+          <a:lstStyle/>
+          <a:p>
+            <a:endParaRPr lang="en-US" dirty="0"/>
+          </a:p>
+        </p:txBody>
+      </p:sp>
+      <p:sp>
+        <p:nvSpPr>
+          <p:cNvPr id="4" name="Slide Number Placeholder 3"/>
+          <p:cNvSpPr>
+            <a:spLocks noGrp="1"/>
+          </p:cNvSpPr>
+          <p:nvPr>
+            <p:ph type="sldNum" sz="quarter" idx="5"/>
+          </p:nvPr>
+        </p:nvSpPr>
+        <p:spPr/>
+        <p:txBody>
+          <a:bodyPr/>
+          <a:lstStyle/>
+          <a:p>
+            <a:fld id="{AC55928C-CD14-454C-B617-1AFCF9A58596}" type="slidenum">
+              <a:rPr lang="en-US" smtClean="0"/>
+              <a:t>24</a:t>
+            </a:fld>
+            <a:endParaRPr lang="en-US" dirty="0"/>
+          </a:p>
+        </p:txBody>
+      </p:sp>
+    </p:spTree>
+    <p:extLst>
+      <p:ext uri="{BB962C8B-B14F-4D97-AF65-F5344CB8AC3E}">
+        <p14:creationId xmlns:p14="http://schemas.microsoft.com/office/powerpoint/2010/main" val="917408208"/>
+      </p:ext>
+    </p:extLst>
+  </p:cSld>
+  <p:clrMapOvr>
+    <a:masterClrMapping/>
+  </p:clrMapOvr>
+</p:notes>
+</file>
+
+<file path=ppt/notesSlides/notesSlide9.xml><?xml version="1.0" encoding="utf-8"?>
+<p:notes xmlns:a="http://schemas.openxmlformats.org/drawingml/2006/main" xmlns:r="http://schemas.openxmlformats.org/officeDocument/2006/relationships" xmlns:p="http://schemas.openxmlformats.org/presentationml/2006/main">
+  <p:cSld>
+    <p:spTree>
+      <p:nvGrpSpPr>
+        <p:cNvPr id="1" name=""/>
+        <p:cNvGrpSpPr/>
+        <p:nvPr/>
+      </p:nvGrpSpPr>
+      <p:grpSpPr>
+        <a:xfrm>
+          <a:off x="0" y="0"/>
+          <a:ext cx="0" cy="0"/>
+          <a:chOff x="0" y="0"/>
+          <a:chExt cx="0" cy="0"/>
+        </a:xfrm>
+      </p:grpSpPr>
+      <p:sp>
+        <p:nvSpPr>
+          <p:cNvPr id="2" name="Slide Image Placeholder 1"/>
+          <p:cNvSpPr>
+            <a:spLocks noGrp="1" noRot="1" noChangeAspect="1"/>
+          </p:cNvSpPr>
+          <p:nvPr>
+            <p:ph type="sldImg"/>
+          </p:nvPr>
+        </p:nvSpPr>
+        <p:spPr/>
+      </p:sp>
+      <p:sp>
+        <p:nvSpPr>
+          <p:cNvPr id="3" name="Notes Placeholder 2"/>
+          <p:cNvSpPr>
+            <a:spLocks noGrp="1"/>
+          </p:cNvSpPr>
+          <p:nvPr>
+            <p:ph type="body" idx="1"/>
+          </p:nvPr>
+        </p:nvSpPr>
+        <p:spPr/>
+        <p:txBody>
+          <a:bodyPr/>
+          <a:lstStyle/>
+          <a:p>
+            <a:r>
+              <a:rPr lang="en-US" dirty="0"/>
+              <a:t>There’s a bunch of bypasses..</a:t>
+            </a:r>
+          </a:p>
+        </p:txBody>
+      </p:sp>
+      <p:sp>
+        <p:nvSpPr>
+          <p:cNvPr id="4" name="Slide Number Placeholder 3"/>
+          <p:cNvSpPr>
+            <a:spLocks noGrp="1"/>
+          </p:cNvSpPr>
+          <p:nvPr>
+            <p:ph type="sldNum" sz="quarter" idx="5"/>
+          </p:nvPr>
+        </p:nvSpPr>
+        <p:spPr/>
+        <p:txBody>
+          <a:bodyPr/>
+          <a:lstStyle/>
+          <a:p>
+            <a:fld id="{AC55928C-CD14-454C-B617-1AFCF9A58596}" type="slidenum">
+              <a:rPr lang="en-US" smtClean="0"/>
+              <a:t>35</a:t>
+            </a:fld>
+            <a:endParaRPr lang="en-US" dirty="0"/>
+          </a:p>
+        </p:txBody>
+      </p:sp>
+    </p:spTree>
+    <p:extLst>
+      <p:ext uri="{BB962C8B-B14F-4D97-AF65-F5344CB8AC3E}">
+        <p14:creationId xmlns:p14="http://schemas.microsoft.com/office/powerpoint/2010/main" val="1311525637"/>
       </p:ext>
     </p:extLst>
   </p:cSld>
@@ -16881,7 +17616,7 @@
                 <a:latin typeface="Calibri"/>
               </a:rPr>
               <a:pPr/>
-              <a:t>11/14/21</a:t>
+              <a:t>3/8/22</a:t>
             </a:fld>
             <a:endParaRPr lang="en-US" dirty="0">
               <a:solidFill>
@@ -17134,7 +17869,7 @@
                 <a:latin typeface="Calibri"/>
               </a:rPr>
               <a:pPr/>
-              <a:t>11/14/21</a:t>
+              <a:t>3/8/22</a:t>
             </a:fld>
             <a:endParaRPr lang="en-US" dirty="0">
               <a:solidFill>
@@ -17349,7 +18084,7 @@
                 <a:latin typeface="Calibri"/>
               </a:rPr>
               <a:pPr/>
-              <a:t>11/14/21</a:t>
+              <a:t>3/8/22</a:t>
             </a:fld>
             <a:endParaRPr lang="en-US" dirty="0">
               <a:solidFill>
@@ -17633,7 +18368,7 @@
                 <a:latin typeface="Calibri"/>
               </a:rPr>
               <a:pPr/>
-              <a:t>11/14/21</a:t>
+              <a:t>3/8/22</a:t>
             </a:fld>
             <a:endParaRPr lang="en-US" dirty="0">
               <a:solidFill>
@@ -17975,7 +18710,7 @@
                 <a:latin typeface="Calibri"/>
               </a:rPr>
               <a:pPr/>
-              <a:t>11/14/21</a:t>
+              <a:t>3/8/22</a:t>
             </a:fld>
             <a:endParaRPr lang="en-US" dirty="0">
               <a:solidFill>
@@ -18303,7 +19038,7 @@
                 <a:latin typeface="Calibri"/>
               </a:rPr>
               <a:pPr/>
-              <a:t>11/14/21</a:t>
+              <a:t>3/8/22</a:t>
             </a:fld>
             <a:endParaRPr lang="en-US" dirty="0">
               <a:solidFill>
@@ -18792,7 +19527,7 @@
                 <a:latin typeface="Calibri"/>
               </a:rPr>
               <a:pPr/>
-              <a:t>11/14/21</a:t>
+              <a:t>3/8/22</a:t>
             </a:fld>
             <a:endParaRPr lang="en-US" dirty="0">
               <a:solidFill>
@@ -18975,7 +19710,7 @@
                 <a:latin typeface="Calibri"/>
               </a:rPr>
               <a:pPr/>
-              <a:t>11/14/21</a:t>
+              <a:t>3/8/22</a:t>
             </a:fld>
             <a:endParaRPr lang="en-US" dirty="0">
               <a:solidFill>
@@ -19221,7 +19956,7 @@
                 <a:latin typeface="Calibri"/>
               </a:rPr>
               <a:pPr/>
-              <a:t>11/14/21</a:t>
+              <a:t>3/8/22</a:t>
             </a:fld>
             <a:endParaRPr lang="en-US" dirty="0">
               <a:solidFill>
@@ -19563,7 +20298,7 @@
                 <a:latin typeface="Calibri"/>
               </a:rPr>
               <a:pPr/>
-              <a:t>11/14/21</a:t>
+              <a:t>3/8/22</a:t>
             </a:fld>
             <a:endParaRPr lang="en-US" dirty="0">
               <a:solidFill>
@@ -19855,7 +20590,7 @@
                 <a:latin typeface="Calibri"/>
               </a:rPr>
               <a:pPr/>
-              <a:t>11/14/21</a:t>
+              <a:t>3/8/22</a:t>
             </a:fld>
             <a:endParaRPr lang="en-US" dirty="0">
               <a:solidFill>
@@ -20105,7 +20840,7 @@
                 <a:latin typeface="Calibri"/>
               </a:rPr>
               <a:pPr defTabSz="914400"/>
-              <a:t>11/14/21</a:t>
+              <a:t>3/8/22</a:t>
             </a:fld>
             <a:endParaRPr lang="en-US" dirty="0">
               <a:solidFill>
@@ -22128,7 +22863,7 @@
           <p:nvPr/>
         </p:nvPicPr>
         <p:blipFill>
-          <a:blip r:embed="rId2"/>
+          <a:blip r:embed="rId3"/>
           <a:stretch>
             <a:fillRect/>
           </a:stretch>
@@ -23069,6 +23804,24 @@
             </a:r>
             <a:r>
               <a:rPr lang="en-US" dirty="0"/>
+              <a:t> is the </a:t>
+            </a:r>
+            <a:r>
+              <a:rPr lang="en-US" b="1" i="1" dirty="0"/>
+              <a:t>hotel</a:t>
+            </a:r>
+          </a:p>
+          <a:p>
+            <a:r>
+              <a:rPr lang="en-US" dirty="0"/>
+              <a:t>The </a:t>
+            </a:r>
+            <a:r>
+              <a:rPr lang="en-US" i="1" dirty="0"/>
+              <a:t>memory</a:t>
+            </a:r>
+            <a:r>
+              <a:rPr lang="en-US" dirty="0"/>
               <a:t> </a:t>
             </a:r>
             <a:r>
@@ -23081,7 +23834,7 @@
             </a:r>
             <a:r>
               <a:rPr lang="en-US" b="1" i="1" dirty="0"/>
-              <a:t>hotel</a:t>
+              <a:t>hotel management</a:t>
             </a:r>
             <a:endParaRPr lang="en-US" b="1" dirty="0"/>
           </a:p>
@@ -24758,7 +25511,7 @@
           <a:p>
             <a:r>
               <a:rPr lang="en-US" dirty="0"/>
-              <a:t>Two chunks point to the same memory (UAF)</a:t>
+              <a:t>Two pointers to the same memory (UAF)</a:t>
             </a:r>
           </a:p>
         </p:txBody>
@@ -26251,19 +27004,24 @@
         </p:spPr>
         <p:txBody>
           <a:bodyPr>
-            <a:normAutofit/>
+            <a:normAutofit fontScale="92500"/>
           </a:bodyPr>
           <a:lstStyle/>
           <a:p>
             <a:r>
               <a:rPr lang="en-US" sz="2200" dirty="0"/>
-              <a:t>The memory allocator is the </a:t>
+              <a:t>The memory is the </a:t>
             </a:r>
             <a:r>
               <a:rPr lang="en-US" sz="2200" i="1" dirty="0"/>
               <a:t>hotel</a:t>
             </a:r>
-            <a:endParaRPr lang="en-US" sz="2200" dirty="0"/>
+          </a:p>
+          <a:p>
+            <a:r>
+              <a:rPr lang="en-US" sz="2200" dirty="0"/>
+              <a:t>The memory allocator is the manager</a:t>
+            </a:r>
           </a:p>
           <a:p>
             <a:r>
@@ -26805,7 +27563,7 @@
           </p:nvPr>
         </p:nvPicPr>
         <p:blipFill>
-          <a:blip r:embed="rId2"/>
+          <a:blip r:embed="rId3"/>
           <a:stretch>
             <a:fillRect/>
           </a:stretch>
@@ -27041,7 +27799,7 @@
         </p:xfrm>
         <a:graphic>
           <a:graphicData uri="http://schemas.openxmlformats.org/drawingml/2006/diagram">
-            <dgm:relIds xmlns:dgm="http://schemas.openxmlformats.org/drawingml/2006/diagram" xmlns:r="http://schemas.openxmlformats.org/officeDocument/2006/relationships" r:dm="rId2" r:lo="rId3" r:qs="rId4" r:cs="rId5"/>
+            <dgm:relIds xmlns:dgm="http://schemas.openxmlformats.org/drawingml/2006/diagram" xmlns:r="http://schemas.openxmlformats.org/officeDocument/2006/relationships" r:dm="rId3" r:lo="rId4" r:qs="rId5" r:cs="rId6"/>
           </a:graphicData>
         </a:graphic>
       </p:graphicFrame>
@@ -27126,7 +27884,7 @@
             <p:ph idx="1"/>
             <p:extLst>
               <p:ext uri="{D42A27DB-BD31-4B8C-83A1-F6EECF244321}">
-                <p14:modId xmlns:p14="http://schemas.microsoft.com/office/powerpoint/2010/main" val="584684978"/>
+                <p14:modId xmlns:p14="http://schemas.microsoft.com/office/powerpoint/2010/main" val="3169653971"/>
               </p:ext>
             </p:extLst>
           </p:nvPr>
@@ -27683,10 +28441,10 @@
           <p:nvPr/>
         </p:nvPicPr>
         <p:blipFill>
-          <a:blip r:embed="rId2">
+          <a:blip r:embed="rId3">
             <a:extLst>
               <a:ext uri="{96DAC541-7B7A-43D3-8B79-37D633B846F1}">
-                <asvg:svgBlip xmlns:asvg="http://schemas.microsoft.com/office/drawing/2016/SVG/main" r:embed="rId3"/>
+                <asvg:svgBlip xmlns:asvg="http://schemas.microsoft.com/office/drawing/2016/SVG/main" r:embed="rId4"/>
               </a:ext>
             </a:extLst>
           </a:blip>
@@ -28089,7 +28847,7 @@
           <a:p>
             <a:r>
               <a:rPr lang="en-US" dirty="0"/>
-              <a:t>Malloc - Create User Code </a:t>
+              <a:t>Malloc – Create a User</a:t>
             </a:r>
           </a:p>
         </p:txBody>

</xml_diff>

<commit_message>
Lots of slide changes prepping for CanSecWest
</commit_message>
<xml_diff>
--- a/modules/vuln_classes/vuln_classes.pptx
+++ b/modules/vuln_classes/vuln_classes.pptx
@@ -16023,7 +16023,7 @@
           <a:p>
             <a:fld id="{2DA23E8D-1792-1541-9147-970A8DD8A355}" type="datetimeFigureOut">
               <a:rPr lang="en-US" smtClean="0"/>
-              <a:t>3/8/22</a:t>
+              <a:t>5/3/22</a:t>
             </a:fld>
             <a:endParaRPr lang="en-US" dirty="0"/>
           </a:p>
@@ -17616,7 +17616,7 @@
                 <a:latin typeface="Calibri"/>
               </a:rPr>
               <a:pPr/>
-              <a:t>3/8/22</a:t>
+              <a:t>5/3/22</a:t>
             </a:fld>
             <a:endParaRPr lang="en-US" dirty="0">
               <a:solidFill>
@@ -17869,7 +17869,7 @@
                 <a:latin typeface="Calibri"/>
               </a:rPr>
               <a:pPr/>
-              <a:t>3/8/22</a:t>
+              <a:t>5/3/22</a:t>
             </a:fld>
             <a:endParaRPr lang="en-US" dirty="0">
               <a:solidFill>
@@ -18084,7 +18084,7 @@
                 <a:latin typeface="Calibri"/>
               </a:rPr>
               <a:pPr/>
-              <a:t>3/8/22</a:t>
+              <a:t>5/3/22</a:t>
             </a:fld>
             <a:endParaRPr lang="en-US" dirty="0">
               <a:solidFill>
@@ -18368,7 +18368,7 @@
                 <a:latin typeface="Calibri"/>
               </a:rPr>
               <a:pPr/>
-              <a:t>3/8/22</a:t>
+              <a:t>5/3/22</a:t>
             </a:fld>
             <a:endParaRPr lang="en-US" dirty="0">
               <a:solidFill>
@@ -18710,7 +18710,7 @@
                 <a:latin typeface="Calibri"/>
               </a:rPr>
               <a:pPr/>
-              <a:t>3/8/22</a:t>
+              <a:t>5/3/22</a:t>
             </a:fld>
             <a:endParaRPr lang="en-US" dirty="0">
               <a:solidFill>
@@ -19038,7 +19038,7 @@
                 <a:latin typeface="Calibri"/>
               </a:rPr>
               <a:pPr/>
-              <a:t>3/8/22</a:t>
+              <a:t>5/3/22</a:t>
             </a:fld>
             <a:endParaRPr lang="en-US" dirty="0">
               <a:solidFill>
@@ -19527,7 +19527,7 @@
                 <a:latin typeface="Calibri"/>
               </a:rPr>
               <a:pPr/>
-              <a:t>3/8/22</a:t>
+              <a:t>5/3/22</a:t>
             </a:fld>
             <a:endParaRPr lang="en-US" dirty="0">
               <a:solidFill>
@@ -19710,7 +19710,7 @@
                 <a:latin typeface="Calibri"/>
               </a:rPr>
               <a:pPr/>
-              <a:t>3/8/22</a:t>
+              <a:t>5/3/22</a:t>
             </a:fld>
             <a:endParaRPr lang="en-US" dirty="0">
               <a:solidFill>
@@ -19956,7 +19956,7 @@
                 <a:latin typeface="Calibri"/>
               </a:rPr>
               <a:pPr/>
-              <a:t>3/8/22</a:t>
+              <a:t>5/3/22</a:t>
             </a:fld>
             <a:endParaRPr lang="en-US" dirty="0">
               <a:solidFill>
@@ -20298,7 +20298,7 @@
                 <a:latin typeface="Calibri"/>
               </a:rPr>
               <a:pPr/>
-              <a:t>3/8/22</a:t>
+              <a:t>5/3/22</a:t>
             </a:fld>
             <a:endParaRPr lang="en-US" dirty="0">
               <a:solidFill>
@@ -20590,7 +20590,7 @@
                 <a:latin typeface="Calibri"/>
               </a:rPr>
               <a:pPr/>
-              <a:t>3/8/22</a:t>
+              <a:t>5/3/22</a:t>
             </a:fld>
             <a:endParaRPr lang="en-US" dirty="0">
               <a:solidFill>
@@ -20840,7 +20840,7 @@
                 <a:latin typeface="Calibri"/>
               </a:rPr>
               <a:pPr defTabSz="914400"/>
-              <a:t>3/8/22</a:t>
+              <a:t>5/3/22</a:t>
             </a:fld>
             <a:endParaRPr lang="en-US" dirty="0">
               <a:solidFill>
@@ -22579,7 +22579,7 @@
           <a:p>
             <a:r>
               <a:rPr lang="en-US" dirty="0"/>
-              <a:t>Free (reset) a player</a:t>
+              <a:t>Free (delete) a player</a:t>
             </a:r>
           </a:p>
           <a:p>
@@ -23207,8 +23207,12 @@
           </a:p>
           <a:p>
             <a:r>
+              <a:rPr lang="en-US"/>
+              <a:t>Delete </a:t>
+            </a:r>
+            <a:r>
               <a:rPr lang="en-US" dirty="0"/>
-              <a:t>Reset User </a:t>
+              <a:t>User </a:t>
             </a:r>
             <a:r>
               <a:rPr lang="en-US" dirty="0">
@@ -24379,7 +24383,7 @@
             </a:r>
             <a:r>
               <a:rPr lang="en-US" dirty="0"/>
-              <a:t>Reset the player</a:t>
+              <a:t>Delete the player</a:t>
             </a:r>
           </a:p>
           <a:p>
@@ -24694,7 +24698,7 @@
           <a:p>
             <a:r>
               <a:rPr lang="en-US" dirty="0"/>
-              <a:t>Free (reset) a player</a:t>
+              <a:t>Free (delete) a player</a:t>
             </a:r>
           </a:p>
           <a:p>
@@ -24838,7 +24842,7 @@
           <a:p>
             <a:r>
               <a:rPr lang="en-US" dirty="0"/>
-              <a:t>Free (reset) a player (again!) </a:t>
+              <a:t>Free (delete) a player (again!) </a:t>
             </a:r>
           </a:p>
           <a:p>
@@ -25948,7 +25952,7 @@
           <a:p>
             <a:r>
               <a:rPr lang="en-US" dirty="0"/>
-              <a:t>Reset User (Free) </a:t>
+              <a:t>Delete User (Free) </a:t>
             </a:r>
             <a:r>
               <a:rPr lang="en-US" dirty="0">
@@ -25960,22 +25964,16 @@
           <a:p>
             <a:r>
               <a:rPr lang="en-US" dirty="0"/>
-              <a:t>Reset User  (Free) </a:t>
+              <a:t>Delete User  (Free) </a:t>
             </a:r>
             <a:r>
               <a:rPr lang="en-US" dirty="0">
                 <a:sym typeface="Wingdings" pitchFamily="2" charset="2"/>
               </a:rPr>
-              <a:t> Frees a </a:t>
-            </a:r>
-            <a:r>
-              <a:rPr lang="en-US">
-                <a:sym typeface="Wingdings" pitchFamily="2" charset="2"/>
-              </a:rPr>
-              <a:t>malloc chunk (</a:t>
-            </a:r>
-            <a:r>
-              <a:rPr lang="en-US" i="1">
+              <a:t> Frees a malloc chunk (</a:t>
+            </a:r>
+            <a:r>
+              <a:rPr lang="en-US" i="1" dirty="0">
                 <a:sym typeface="Wingdings" pitchFamily="2" charset="2"/>
               </a:rPr>
               <a:t>again)</a:t>

</xml_diff>